<commit_message>
add: pptx for assignment
</commit_message>
<xml_diff>
--- a/assignment1/lab-1-decommenter.pptx
+++ b/assignment1/lab-1-decommenter.pptx
@@ -5,7 +5,7 @@
     <p:sldMasterId id="2147483663" r:id="rId4"/>
   </p:sldMasterIdLst>
   <p:notesMasterIdLst>
-    <p:notesMasterId r:id="rId21"/>
+    <p:notesMasterId r:id="rId22"/>
   </p:notesMasterIdLst>
   <p:sldIdLst>
     <p:sldId id="282" r:id="rId5"/>
@@ -13,39 +13,40 @@
     <p:sldId id="327" r:id="rId7"/>
     <p:sldId id="317" r:id="rId8"/>
     <p:sldId id="328" r:id="rId9"/>
-    <p:sldId id="319" r:id="rId10"/>
-    <p:sldId id="320" r:id="rId11"/>
-    <p:sldId id="321" r:id="rId12"/>
-    <p:sldId id="322" r:id="rId13"/>
-    <p:sldId id="323" r:id="rId14"/>
-    <p:sldId id="324" r:id="rId15"/>
-    <p:sldId id="333" r:id="rId16"/>
-    <p:sldId id="331" r:id="rId17"/>
-    <p:sldId id="329" r:id="rId18"/>
-    <p:sldId id="330" r:id="rId19"/>
-    <p:sldId id="332" r:id="rId20"/>
+    <p:sldId id="334" r:id="rId10"/>
+    <p:sldId id="319" r:id="rId11"/>
+    <p:sldId id="320" r:id="rId12"/>
+    <p:sldId id="321" r:id="rId13"/>
+    <p:sldId id="322" r:id="rId14"/>
+    <p:sldId id="323" r:id="rId15"/>
+    <p:sldId id="324" r:id="rId16"/>
+    <p:sldId id="333" r:id="rId17"/>
+    <p:sldId id="331" r:id="rId18"/>
+    <p:sldId id="329" r:id="rId19"/>
+    <p:sldId id="330" r:id="rId20"/>
+    <p:sldId id="332" r:id="rId21"/>
   </p:sldIdLst>
   <p:sldSz cx="12192000" cy="6858000"/>
   <p:notesSz cx="6858000" cy="9144000"/>
   <p:embeddedFontLst>
     <p:embeddedFont>
       <p:font typeface="Bahnschrift" panose="020B0502040204020203" pitchFamily="34" charset="0"/>
-      <p:regular r:id="rId22"/>
-      <p:bold r:id="rId23"/>
+      <p:regular r:id="rId23"/>
+      <p:bold r:id="rId24"/>
     </p:embeddedFont>
     <p:embeddedFont>
       <p:font typeface="Bahnschrift Light" panose="020B0502040204020203" pitchFamily="34" charset="0"/>
-      <p:regular r:id="rId24"/>
+      <p:regular r:id="rId25"/>
     </p:embeddedFont>
     <p:embeddedFont>
       <p:font typeface="나눔바른고딕" panose="020B0603020101020101" pitchFamily="50" charset="-127"/>
-      <p:regular r:id="rId25"/>
-      <p:bold r:id="rId26"/>
+      <p:regular r:id="rId26"/>
+      <p:bold r:id="rId27"/>
     </p:embeddedFont>
     <p:embeddedFont>
       <p:font typeface="맑은 고딕" panose="020B0503020000020004" pitchFamily="50" charset="-127"/>
-      <p:regular r:id="rId27"/>
-      <p:bold r:id="rId28"/>
+      <p:regular r:id="rId28"/>
+      <p:bold r:id="rId29"/>
     </p:embeddedFont>
   </p:embeddedFontLst>
   <p:defaultTextStyle>
@@ -236,7 +237,7 @@
           <a:p>
             <a:fld id="{695D94AF-96EB-487C-B939-6CE2DFBD4DC7}" type="datetimeFigureOut">
               <a:rPr lang="ko-KR" altLang="en-US" smtClean="0"/>
-              <a:t>2024-09-03</a:t>
+              <a:t>2024-09-09</a:t>
             </a:fld>
             <a:endParaRPr lang="ko-KR" altLang="en-US" dirty="0"/>
           </a:p>
@@ -595,6 +596,114 @@
         <p:cNvPr id="1" name="">
           <a:extLst>
             <a:ext uri="{FF2B5EF4-FFF2-40B4-BE49-F238E27FC236}">
+              <a16:creationId xmlns:a16="http://schemas.microsoft.com/office/drawing/2014/main" id="{8BBD3E48-AADA-EB78-09EE-178D5AD26C18}"/>
+            </a:ext>
+          </a:extLst>
+        </p:cNvPr>
+        <p:cNvGrpSpPr/>
+        <p:nvPr/>
+      </p:nvGrpSpPr>
+      <p:grpSpPr>
+        <a:xfrm>
+          <a:off x="0" y="0"/>
+          <a:ext cx="0" cy="0"/>
+          <a:chOff x="0" y="0"/>
+          <a:chExt cx="0" cy="0"/>
+        </a:xfrm>
+      </p:grpSpPr>
+      <p:sp>
+        <p:nvSpPr>
+          <p:cNvPr id="2" name="슬라이드 이미지 개체 틀 1">
+            <a:extLst>
+              <a:ext uri="{FF2B5EF4-FFF2-40B4-BE49-F238E27FC236}">
+                <a16:creationId xmlns:a16="http://schemas.microsoft.com/office/drawing/2014/main" id="{BA7A7319-9E1B-3C6D-9C82-47EB2CEC909C}"/>
+              </a:ext>
+            </a:extLst>
+          </p:cNvPr>
+          <p:cNvSpPr>
+            <a:spLocks noGrp="1" noRot="1" noChangeAspect="1"/>
+          </p:cNvSpPr>
+          <p:nvPr>
+            <p:ph type="sldImg"/>
+          </p:nvPr>
+        </p:nvSpPr>
+        <p:spPr/>
+      </p:sp>
+      <p:sp>
+        <p:nvSpPr>
+          <p:cNvPr id="3" name="슬라이드 노트 개체 틀 2">
+            <a:extLst>
+              <a:ext uri="{FF2B5EF4-FFF2-40B4-BE49-F238E27FC236}">
+                <a16:creationId xmlns:a16="http://schemas.microsoft.com/office/drawing/2014/main" id="{79461770-9689-BC8B-63DD-05C34872AB96}"/>
+              </a:ext>
+            </a:extLst>
+          </p:cNvPr>
+          <p:cNvSpPr>
+            <a:spLocks noGrp="1"/>
+          </p:cNvSpPr>
+          <p:nvPr>
+            <p:ph type="body" idx="1"/>
+          </p:nvPr>
+        </p:nvSpPr>
+        <p:spPr/>
+        <p:txBody>
+          <a:bodyPr/>
+          <a:lstStyle/>
+          <a:p>
+            <a:endParaRPr lang="en-US" altLang="ko-KR" dirty="0"/>
+          </a:p>
+        </p:txBody>
+      </p:sp>
+      <p:sp>
+        <p:nvSpPr>
+          <p:cNvPr id="4" name="슬라이드 번호 개체 틀 3">
+            <a:extLst>
+              <a:ext uri="{FF2B5EF4-FFF2-40B4-BE49-F238E27FC236}">
+                <a16:creationId xmlns:a16="http://schemas.microsoft.com/office/drawing/2014/main" id="{11C089A4-9F40-7E85-AA97-50F94095D4B4}"/>
+              </a:ext>
+            </a:extLst>
+          </p:cNvPr>
+          <p:cNvSpPr>
+            <a:spLocks noGrp="1"/>
+          </p:cNvSpPr>
+          <p:nvPr>
+            <p:ph type="sldNum" sz="quarter" idx="5"/>
+          </p:nvPr>
+        </p:nvSpPr>
+        <p:spPr/>
+        <p:txBody>
+          <a:bodyPr/>
+          <a:lstStyle/>
+          <a:p>
+            <a:fld id="{BDC154FB-B7D0-4F76-BDDE-18AD8868F6C3}" type="slidenum">
+              <a:rPr lang="ko-KR" altLang="en-US" smtClean="0"/>
+              <a:t>10</a:t>
+            </a:fld>
+            <a:endParaRPr lang="ko-KR" altLang="en-US" dirty="0"/>
+          </a:p>
+        </p:txBody>
+      </p:sp>
+    </p:spTree>
+    <p:extLst>
+      <p:ext uri="{BB962C8B-B14F-4D97-AF65-F5344CB8AC3E}">
+        <p14:creationId xmlns:p14="http://schemas.microsoft.com/office/powerpoint/2010/main" val="1180959186"/>
+      </p:ext>
+    </p:extLst>
+  </p:cSld>
+  <p:clrMapOvr>
+    <a:masterClrMapping/>
+  </p:clrMapOvr>
+</p:notes>
+</file>
+
+<file path=ppt/notesSlides/notesSlide11.xml><?xml version="1.0" encoding="utf-8"?>
+<p:notes xmlns:a="http://schemas.openxmlformats.org/drawingml/2006/main" xmlns:r="http://schemas.openxmlformats.org/officeDocument/2006/relationships" xmlns:p="http://schemas.openxmlformats.org/presentationml/2006/main">
+  <p:cSld>
+    <p:spTree>
+      <p:nvGrpSpPr>
+        <p:cNvPr id="1" name="">
+          <a:extLst>
+            <a:ext uri="{FF2B5EF4-FFF2-40B4-BE49-F238E27FC236}">
               <a16:creationId xmlns:a16="http://schemas.microsoft.com/office/drawing/2014/main" id="{837A6976-C98D-ED91-5821-4DAAA9CA3A88}"/>
             </a:ext>
           </a:extLst>
@@ -676,7 +785,7 @@
           <a:p>
             <a:fld id="{BDC154FB-B7D0-4F76-BDDE-18AD8868F6C3}" type="slidenum">
               <a:rPr lang="ko-KR" altLang="en-US" smtClean="0"/>
-              <a:t>10</a:t>
+              <a:t>11</a:t>
             </a:fld>
             <a:endParaRPr lang="ko-KR" altLang="en-US" dirty="0"/>
           </a:p>
@@ -695,7 +804,7 @@
 </p:notes>
 </file>
 
-<file path=ppt/notesSlides/notesSlide11.xml><?xml version="1.0" encoding="utf-8"?>
+<file path=ppt/notesSlides/notesSlide12.xml><?xml version="1.0" encoding="utf-8"?>
 <p:notes xmlns:a="http://schemas.openxmlformats.org/drawingml/2006/main" xmlns:r="http://schemas.openxmlformats.org/officeDocument/2006/relationships" xmlns:p="http://schemas.openxmlformats.org/presentationml/2006/main">
   <p:cSld>
     <p:spTree>
@@ -784,7 +893,7 @@
           <a:p>
             <a:fld id="{BDC154FB-B7D0-4F76-BDDE-18AD8868F6C3}" type="slidenum">
               <a:rPr lang="ko-KR" altLang="en-US" smtClean="0"/>
-              <a:t>11</a:t>
+              <a:t>12</a:t>
             </a:fld>
             <a:endParaRPr lang="ko-KR" altLang="en-US" dirty="0"/>
           </a:p>
@@ -803,7 +912,7 @@
 </p:notes>
 </file>
 
-<file path=ppt/notesSlides/notesSlide12.xml><?xml version="1.0" encoding="utf-8"?>
+<file path=ppt/notesSlides/notesSlide13.xml><?xml version="1.0" encoding="utf-8"?>
 <p:notes xmlns:a="http://schemas.openxmlformats.org/drawingml/2006/main" xmlns:r="http://schemas.openxmlformats.org/officeDocument/2006/relationships" xmlns:p="http://schemas.openxmlformats.org/presentationml/2006/main">
   <p:cSld>
     <p:spTree>
@@ -892,7 +1001,7 @@
           <a:p>
             <a:fld id="{BDC154FB-B7D0-4F76-BDDE-18AD8868F6C3}" type="slidenum">
               <a:rPr lang="ko-KR" altLang="en-US" smtClean="0"/>
-              <a:t>12</a:t>
+              <a:t>13</a:t>
             </a:fld>
             <a:endParaRPr lang="ko-KR" altLang="en-US" dirty="0"/>
           </a:p>
@@ -911,7 +1020,7 @@
 </p:notes>
 </file>
 
-<file path=ppt/notesSlides/notesSlide13.xml><?xml version="1.0" encoding="utf-8"?>
+<file path=ppt/notesSlides/notesSlide14.xml><?xml version="1.0" encoding="utf-8"?>
 <p:notes xmlns:a="http://schemas.openxmlformats.org/drawingml/2006/main" xmlns:r="http://schemas.openxmlformats.org/officeDocument/2006/relationships" xmlns:p="http://schemas.openxmlformats.org/presentationml/2006/main">
   <p:cSld>
     <p:spTree>
@@ -1000,7 +1109,7 @@
           <a:p>
             <a:fld id="{BDC154FB-B7D0-4F76-BDDE-18AD8868F6C3}" type="slidenum">
               <a:rPr lang="ko-KR" altLang="en-US" smtClean="0"/>
-              <a:t>13</a:t>
+              <a:t>14</a:t>
             </a:fld>
             <a:endParaRPr lang="ko-KR" altLang="en-US" dirty="0"/>
           </a:p>
@@ -1019,7 +1128,7 @@
 </p:notes>
 </file>
 
-<file path=ppt/notesSlides/notesSlide14.xml><?xml version="1.0" encoding="utf-8"?>
+<file path=ppt/notesSlides/notesSlide15.xml><?xml version="1.0" encoding="utf-8"?>
 <p:notes xmlns:a="http://schemas.openxmlformats.org/drawingml/2006/main" xmlns:r="http://schemas.openxmlformats.org/officeDocument/2006/relationships" xmlns:p="http://schemas.openxmlformats.org/presentationml/2006/main">
   <p:cSld>
     <p:spTree>
@@ -1108,7 +1217,7 @@
           <a:p>
             <a:fld id="{BDC154FB-B7D0-4F76-BDDE-18AD8868F6C3}" type="slidenum">
               <a:rPr lang="ko-KR" altLang="en-US" smtClean="0"/>
-              <a:t>14</a:t>
+              <a:t>15</a:t>
             </a:fld>
             <a:endParaRPr lang="ko-KR" altLang="en-US" dirty="0"/>
           </a:p>
@@ -1127,7 +1236,7 @@
 </p:notes>
 </file>
 
-<file path=ppt/notesSlides/notesSlide15.xml><?xml version="1.0" encoding="utf-8"?>
+<file path=ppt/notesSlides/notesSlide16.xml><?xml version="1.0" encoding="utf-8"?>
 <p:notes xmlns:a="http://schemas.openxmlformats.org/drawingml/2006/main" xmlns:r="http://schemas.openxmlformats.org/officeDocument/2006/relationships" xmlns:p="http://schemas.openxmlformats.org/presentationml/2006/main">
   <p:cSld>
     <p:spTree>
@@ -1216,7 +1325,7 @@
           <a:p>
             <a:fld id="{BDC154FB-B7D0-4F76-BDDE-18AD8868F6C3}" type="slidenum">
               <a:rPr lang="ko-KR" altLang="en-US" smtClean="0"/>
-              <a:t>15</a:t>
+              <a:t>16</a:t>
             </a:fld>
             <a:endParaRPr lang="ko-KR" altLang="en-US" dirty="0"/>
           </a:p>
@@ -1235,7 +1344,7 @@
 </p:notes>
 </file>
 
-<file path=ppt/notesSlides/notesSlide16.xml><?xml version="1.0" encoding="utf-8"?>
+<file path=ppt/notesSlides/notesSlide17.xml><?xml version="1.0" encoding="utf-8"?>
 <p:notes xmlns:a="http://schemas.openxmlformats.org/drawingml/2006/main" xmlns:r="http://schemas.openxmlformats.org/officeDocument/2006/relationships" xmlns:p="http://schemas.openxmlformats.org/presentationml/2006/main">
   <p:cSld>
     <p:spTree>
@@ -1324,7 +1433,7 @@
           <a:p>
             <a:fld id="{BDC154FB-B7D0-4F76-BDDE-18AD8868F6C3}" type="slidenum">
               <a:rPr lang="ko-KR" altLang="en-US" smtClean="0"/>
-              <a:t>16</a:t>
+              <a:t>17</a:t>
             </a:fld>
             <a:endParaRPr lang="ko-KR" altLang="en-US" dirty="0"/>
           </a:p>
@@ -1759,6 +1868,114 @@
         <p:cNvPr id="1" name="">
           <a:extLst>
             <a:ext uri="{FF2B5EF4-FFF2-40B4-BE49-F238E27FC236}">
+              <a16:creationId xmlns:a16="http://schemas.microsoft.com/office/drawing/2014/main" id="{8FBE6A6B-CFB1-5917-37AE-D7455F4E6C07}"/>
+            </a:ext>
+          </a:extLst>
+        </p:cNvPr>
+        <p:cNvGrpSpPr/>
+        <p:nvPr/>
+      </p:nvGrpSpPr>
+      <p:grpSpPr>
+        <a:xfrm>
+          <a:off x="0" y="0"/>
+          <a:ext cx="0" cy="0"/>
+          <a:chOff x="0" y="0"/>
+          <a:chExt cx="0" cy="0"/>
+        </a:xfrm>
+      </p:grpSpPr>
+      <p:sp>
+        <p:nvSpPr>
+          <p:cNvPr id="2" name="슬라이드 이미지 개체 틀 1">
+            <a:extLst>
+              <a:ext uri="{FF2B5EF4-FFF2-40B4-BE49-F238E27FC236}">
+                <a16:creationId xmlns:a16="http://schemas.microsoft.com/office/drawing/2014/main" id="{EC1A9678-6BC1-401F-BDF9-80EA0FA5FE90}"/>
+              </a:ext>
+            </a:extLst>
+          </p:cNvPr>
+          <p:cNvSpPr>
+            <a:spLocks noGrp="1" noRot="1" noChangeAspect="1"/>
+          </p:cNvSpPr>
+          <p:nvPr>
+            <p:ph type="sldImg"/>
+          </p:nvPr>
+        </p:nvSpPr>
+        <p:spPr/>
+      </p:sp>
+      <p:sp>
+        <p:nvSpPr>
+          <p:cNvPr id="3" name="슬라이드 노트 개체 틀 2">
+            <a:extLst>
+              <a:ext uri="{FF2B5EF4-FFF2-40B4-BE49-F238E27FC236}">
+                <a16:creationId xmlns:a16="http://schemas.microsoft.com/office/drawing/2014/main" id="{E8DCD910-626F-9189-A3CD-505FA47FF758}"/>
+              </a:ext>
+            </a:extLst>
+          </p:cNvPr>
+          <p:cNvSpPr>
+            <a:spLocks noGrp="1"/>
+          </p:cNvSpPr>
+          <p:nvPr>
+            <p:ph type="body" idx="1"/>
+          </p:nvPr>
+        </p:nvSpPr>
+        <p:spPr/>
+        <p:txBody>
+          <a:bodyPr/>
+          <a:lstStyle/>
+          <a:p>
+            <a:endParaRPr lang="en-US" altLang="ko-KR" dirty="0"/>
+          </a:p>
+        </p:txBody>
+      </p:sp>
+      <p:sp>
+        <p:nvSpPr>
+          <p:cNvPr id="4" name="슬라이드 번호 개체 틀 3">
+            <a:extLst>
+              <a:ext uri="{FF2B5EF4-FFF2-40B4-BE49-F238E27FC236}">
+                <a16:creationId xmlns:a16="http://schemas.microsoft.com/office/drawing/2014/main" id="{29E17D39-C312-5F8A-1971-5A002E9D6699}"/>
+              </a:ext>
+            </a:extLst>
+          </p:cNvPr>
+          <p:cNvSpPr>
+            <a:spLocks noGrp="1"/>
+          </p:cNvSpPr>
+          <p:nvPr>
+            <p:ph type="sldNum" sz="quarter" idx="5"/>
+          </p:nvPr>
+        </p:nvSpPr>
+        <p:spPr/>
+        <p:txBody>
+          <a:bodyPr/>
+          <a:lstStyle/>
+          <a:p>
+            <a:fld id="{BDC154FB-B7D0-4F76-BDDE-18AD8868F6C3}" type="slidenum">
+              <a:rPr lang="ko-KR" altLang="en-US" smtClean="0"/>
+              <a:t>6</a:t>
+            </a:fld>
+            <a:endParaRPr lang="ko-KR" altLang="en-US" dirty="0"/>
+          </a:p>
+        </p:txBody>
+      </p:sp>
+    </p:spTree>
+    <p:extLst>
+      <p:ext uri="{BB962C8B-B14F-4D97-AF65-F5344CB8AC3E}">
+        <p14:creationId xmlns:p14="http://schemas.microsoft.com/office/powerpoint/2010/main" val="3766417558"/>
+      </p:ext>
+    </p:extLst>
+  </p:cSld>
+  <p:clrMapOvr>
+    <a:masterClrMapping/>
+  </p:clrMapOvr>
+</p:notes>
+</file>
+
+<file path=ppt/notesSlides/notesSlide7.xml><?xml version="1.0" encoding="utf-8"?>
+<p:notes xmlns:a="http://schemas.openxmlformats.org/drawingml/2006/main" xmlns:r="http://schemas.openxmlformats.org/officeDocument/2006/relationships" xmlns:p="http://schemas.openxmlformats.org/presentationml/2006/main">
+  <p:cSld>
+    <p:spTree>
+      <p:nvGrpSpPr>
+        <p:cNvPr id="1" name="">
+          <a:extLst>
+            <a:ext uri="{FF2B5EF4-FFF2-40B4-BE49-F238E27FC236}">
               <a16:creationId xmlns:a16="http://schemas.microsoft.com/office/drawing/2014/main" id="{2C9645DC-A640-2AA3-87F1-998AE718C16A}"/>
             </a:ext>
           </a:extLst>
@@ -1813,7 +2030,27 @@
           <a:bodyPr/>
           <a:lstStyle/>
           <a:p>
-            <a:endParaRPr lang="en-US" altLang="ko-KR" dirty="0"/>
+            <a:pPr marL="0" marR="0" lvl="0" indent="0" algn="l" defTabSz="914400" rtl="0" eaLnBrk="1" fontAlgn="auto" latinLnBrk="1" hangingPunct="1">
+              <a:lnSpc>
+                <a:spcPct val="100000"/>
+              </a:lnSpc>
+              <a:spcBef>
+                <a:spcPts val="0"/>
+              </a:spcBef>
+              <a:spcAft>
+                <a:spcPts val="0"/>
+              </a:spcAft>
+              <a:buClrTx/>
+              <a:buSzTx/>
+              <a:buFontTx/>
+              <a:buNone/>
+              <a:tabLst/>
+              <a:defRPr/>
+            </a:pPr>
+            <a:endParaRPr lang="en-US" altLang="ko-KR" b="0" dirty="0">
+              <a:latin typeface="+mn-ea"/>
+              <a:ea typeface="+mn-ea"/>
+            </a:endParaRPr>
           </a:p>
         </p:txBody>
       </p:sp>
@@ -1840,7 +2077,7 @@
           <a:p>
             <a:fld id="{BDC154FB-B7D0-4F76-BDDE-18AD8868F6C3}" type="slidenum">
               <a:rPr lang="ko-KR" altLang="en-US" smtClean="0"/>
-              <a:t>6</a:t>
+              <a:t>7</a:t>
             </a:fld>
             <a:endParaRPr lang="ko-KR" altLang="en-US" dirty="0"/>
           </a:p>
@@ -1859,7 +2096,7 @@
 </p:notes>
 </file>
 
-<file path=ppt/notesSlides/notesSlide7.xml><?xml version="1.0" encoding="utf-8"?>
+<file path=ppt/notesSlides/notesSlide8.xml><?xml version="1.0" encoding="utf-8"?>
 <p:notes xmlns:a="http://schemas.openxmlformats.org/drawingml/2006/main" xmlns:r="http://schemas.openxmlformats.org/officeDocument/2006/relationships" xmlns:p="http://schemas.openxmlformats.org/presentationml/2006/main">
   <p:cSld>
     <p:spTree>
@@ -1948,7 +2185,7 @@
           <a:p>
             <a:fld id="{BDC154FB-B7D0-4F76-BDDE-18AD8868F6C3}" type="slidenum">
               <a:rPr lang="ko-KR" altLang="en-US" smtClean="0"/>
-              <a:t>7</a:t>
+              <a:t>8</a:t>
             </a:fld>
             <a:endParaRPr lang="ko-KR" altLang="en-US" dirty="0"/>
           </a:p>
@@ -1967,7 +2204,7 @@
 </p:notes>
 </file>
 
-<file path=ppt/notesSlides/notesSlide8.xml><?xml version="1.0" encoding="utf-8"?>
+<file path=ppt/notesSlides/notesSlide9.xml><?xml version="1.0" encoding="utf-8"?>
 <p:notes xmlns:a="http://schemas.openxmlformats.org/drawingml/2006/main" xmlns:r="http://schemas.openxmlformats.org/officeDocument/2006/relationships" xmlns:p="http://schemas.openxmlformats.org/presentationml/2006/main">
   <p:cSld>
     <p:spTree>
@@ -2056,7 +2293,7 @@
           <a:p>
             <a:fld id="{BDC154FB-B7D0-4F76-BDDE-18AD8868F6C3}" type="slidenum">
               <a:rPr lang="ko-KR" altLang="en-US" smtClean="0"/>
-              <a:t>8</a:t>
+              <a:t>9</a:t>
             </a:fld>
             <a:endParaRPr lang="ko-KR" altLang="en-US" dirty="0"/>
           </a:p>
@@ -2066,114 +2303,6 @@
     <p:extLst>
       <p:ext uri="{BB962C8B-B14F-4D97-AF65-F5344CB8AC3E}">
         <p14:creationId xmlns:p14="http://schemas.microsoft.com/office/powerpoint/2010/main" val="1712504383"/>
-      </p:ext>
-    </p:extLst>
-  </p:cSld>
-  <p:clrMapOvr>
-    <a:masterClrMapping/>
-  </p:clrMapOvr>
-</p:notes>
-</file>
-
-<file path=ppt/notesSlides/notesSlide9.xml><?xml version="1.0" encoding="utf-8"?>
-<p:notes xmlns:a="http://schemas.openxmlformats.org/drawingml/2006/main" xmlns:r="http://schemas.openxmlformats.org/officeDocument/2006/relationships" xmlns:p="http://schemas.openxmlformats.org/presentationml/2006/main">
-  <p:cSld>
-    <p:spTree>
-      <p:nvGrpSpPr>
-        <p:cNvPr id="1" name="">
-          <a:extLst>
-            <a:ext uri="{FF2B5EF4-FFF2-40B4-BE49-F238E27FC236}">
-              <a16:creationId xmlns:a16="http://schemas.microsoft.com/office/drawing/2014/main" id="{8BBD3E48-AADA-EB78-09EE-178D5AD26C18}"/>
-            </a:ext>
-          </a:extLst>
-        </p:cNvPr>
-        <p:cNvGrpSpPr/>
-        <p:nvPr/>
-      </p:nvGrpSpPr>
-      <p:grpSpPr>
-        <a:xfrm>
-          <a:off x="0" y="0"/>
-          <a:ext cx="0" cy="0"/>
-          <a:chOff x="0" y="0"/>
-          <a:chExt cx="0" cy="0"/>
-        </a:xfrm>
-      </p:grpSpPr>
-      <p:sp>
-        <p:nvSpPr>
-          <p:cNvPr id="2" name="슬라이드 이미지 개체 틀 1">
-            <a:extLst>
-              <a:ext uri="{FF2B5EF4-FFF2-40B4-BE49-F238E27FC236}">
-                <a16:creationId xmlns:a16="http://schemas.microsoft.com/office/drawing/2014/main" id="{BA7A7319-9E1B-3C6D-9C82-47EB2CEC909C}"/>
-              </a:ext>
-            </a:extLst>
-          </p:cNvPr>
-          <p:cNvSpPr>
-            <a:spLocks noGrp="1" noRot="1" noChangeAspect="1"/>
-          </p:cNvSpPr>
-          <p:nvPr>
-            <p:ph type="sldImg"/>
-          </p:nvPr>
-        </p:nvSpPr>
-        <p:spPr/>
-      </p:sp>
-      <p:sp>
-        <p:nvSpPr>
-          <p:cNvPr id="3" name="슬라이드 노트 개체 틀 2">
-            <a:extLst>
-              <a:ext uri="{FF2B5EF4-FFF2-40B4-BE49-F238E27FC236}">
-                <a16:creationId xmlns:a16="http://schemas.microsoft.com/office/drawing/2014/main" id="{79461770-9689-BC8B-63DD-05C34872AB96}"/>
-              </a:ext>
-            </a:extLst>
-          </p:cNvPr>
-          <p:cNvSpPr>
-            <a:spLocks noGrp="1"/>
-          </p:cNvSpPr>
-          <p:nvPr>
-            <p:ph type="body" idx="1"/>
-          </p:nvPr>
-        </p:nvSpPr>
-        <p:spPr/>
-        <p:txBody>
-          <a:bodyPr/>
-          <a:lstStyle/>
-          <a:p>
-            <a:endParaRPr lang="en-US" altLang="ko-KR" dirty="0"/>
-          </a:p>
-        </p:txBody>
-      </p:sp>
-      <p:sp>
-        <p:nvSpPr>
-          <p:cNvPr id="4" name="슬라이드 번호 개체 틀 3">
-            <a:extLst>
-              <a:ext uri="{FF2B5EF4-FFF2-40B4-BE49-F238E27FC236}">
-                <a16:creationId xmlns:a16="http://schemas.microsoft.com/office/drawing/2014/main" id="{11C089A4-9F40-7E85-AA97-50F94095D4B4}"/>
-              </a:ext>
-            </a:extLst>
-          </p:cNvPr>
-          <p:cNvSpPr>
-            <a:spLocks noGrp="1"/>
-          </p:cNvSpPr>
-          <p:nvPr>
-            <p:ph type="sldNum" sz="quarter" idx="5"/>
-          </p:nvPr>
-        </p:nvSpPr>
-        <p:spPr/>
-        <p:txBody>
-          <a:bodyPr/>
-          <a:lstStyle/>
-          <a:p>
-            <a:fld id="{BDC154FB-B7D0-4F76-BDDE-18AD8868F6C3}" type="slidenum">
-              <a:rPr lang="ko-KR" altLang="en-US" smtClean="0"/>
-              <a:t>9</a:t>
-            </a:fld>
-            <a:endParaRPr lang="ko-KR" altLang="en-US" dirty="0"/>
-          </a:p>
-        </p:txBody>
-      </p:sp>
-    </p:spTree>
-    <p:extLst>
-      <p:ext uri="{BB962C8B-B14F-4D97-AF65-F5344CB8AC3E}">
-        <p14:creationId xmlns:p14="http://schemas.microsoft.com/office/powerpoint/2010/main" val="1180959186"/>
       </p:ext>
     </p:extLst>
   </p:cSld>
@@ -4141,6 +4270,753 @@
         <p:cNvPr id="1" name="">
           <a:extLst>
             <a:ext uri="{FF2B5EF4-FFF2-40B4-BE49-F238E27FC236}">
+              <a16:creationId xmlns:a16="http://schemas.microsoft.com/office/drawing/2014/main" id="{1B2CB311-DC1A-76F9-2E13-2C8F5671ECAC}"/>
+            </a:ext>
+          </a:extLst>
+        </p:cNvPr>
+        <p:cNvGrpSpPr/>
+        <p:nvPr/>
+      </p:nvGrpSpPr>
+      <p:grpSpPr>
+        <a:xfrm>
+          <a:off x="0" y="0"/>
+          <a:ext cx="0" cy="0"/>
+          <a:chOff x="0" y="0"/>
+          <a:chExt cx="0" cy="0"/>
+        </a:xfrm>
+      </p:grpSpPr>
+      <p:sp>
+        <p:nvSpPr>
+          <p:cNvPr id="2" name="슬라이드 번호 개체 틀 1">
+            <a:extLst>
+              <a:ext uri="{FF2B5EF4-FFF2-40B4-BE49-F238E27FC236}">
+                <a16:creationId xmlns:a16="http://schemas.microsoft.com/office/drawing/2014/main" id="{A2893DB1-A2C7-DE9A-5ACD-7C8DC81AC1EE}"/>
+              </a:ext>
+            </a:extLst>
+          </p:cNvPr>
+          <p:cNvSpPr>
+            <a:spLocks noGrp="1"/>
+          </p:cNvSpPr>
+          <p:nvPr>
+            <p:ph type="sldNum" sz="quarter" idx="12"/>
+          </p:nvPr>
+        </p:nvSpPr>
+        <p:spPr/>
+        <p:txBody>
+          <a:bodyPr/>
+          <a:lstStyle/>
+          <a:p>
+            <a:r>
+              <a:rPr lang="en-US" altLang="ko-KR" dirty="0"/>
+              <a:t>-</a:t>
+            </a:r>
+            <a:fld id="{3D16D23B-24D6-455E-BBD7-6975BEA16FD4}" type="slidenum">
+              <a:rPr lang="ko-KR" altLang="en-US" smtClean="0"/>
+              <a:pPr/>
+              <a:t>10</a:t>
+            </a:fld>
+            <a:r>
+              <a:rPr lang="en-US" altLang="ko-KR" dirty="0"/>
+              <a:t>-</a:t>
+            </a:r>
+            <a:endParaRPr lang="ko-KR" altLang="en-US" dirty="0"/>
+          </a:p>
+        </p:txBody>
+      </p:sp>
+      <p:sp>
+        <p:nvSpPr>
+          <p:cNvPr id="3" name="제목 2">
+            <a:extLst>
+              <a:ext uri="{FF2B5EF4-FFF2-40B4-BE49-F238E27FC236}">
+                <a16:creationId xmlns:a16="http://schemas.microsoft.com/office/drawing/2014/main" id="{7AE11317-F4E2-3DF5-690D-CECB7AA1E5CD}"/>
+              </a:ext>
+            </a:extLst>
+          </p:cNvPr>
+          <p:cNvSpPr>
+            <a:spLocks noGrp="1"/>
+          </p:cNvSpPr>
+          <p:nvPr>
+            <p:ph type="title"/>
+          </p:nvPr>
+        </p:nvSpPr>
+        <p:spPr>
+          <a:xfrm>
+            <a:off x="391886" y="173474"/>
+            <a:ext cx="11800114" cy="573577"/>
+          </a:xfrm>
+        </p:spPr>
+        <p:txBody>
+          <a:bodyPr/>
+          <a:lstStyle/>
+          <a:p>
+            <a:r>
+              <a:rPr lang="en-US" altLang="ko-KR" dirty="0">
+                <a:latin typeface="+mj-ea"/>
+              </a:rPr>
+              <a:t>Requirements – Handle Unterminated Str and Char Const (7/9)</a:t>
+            </a:r>
+            <a:endParaRPr lang="ko-KR" altLang="en-US" dirty="0">
+              <a:latin typeface="+mj-ea"/>
+            </a:endParaRPr>
+          </a:p>
+        </p:txBody>
+      </p:sp>
+      <p:sp>
+        <p:nvSpPr>
+          <p:cNvPr id="4" name="텍스트 개체 틀 3">
+            <a:extLst>
+              <a:ext uri="{FF2B5EF4-FFF2-40B4-BE49-F238E27FC236}">
+                <a16:creationId xmlns:a16="http://schemas.microsoft.com/office/drawing/2014/main" id="{A78D9850-5D63-BAD4-9A94-F3B2580CCCAF}"/>
+              </a:ext>
+            </a:extLst>
+          </p:cNvPr>
+          <p:cNvSpPr>
+            <a:spLocks noGrp="1"/>
+          </p:cNvSpPr>
+          <p:nvPr>
+            <p:ph type="body" sz="quarter" idx="13"/>
+          </p:nvPr>
+        </p:nvSpPr>
+        <p:spPr>
+          <a:xfrm>
+            <a:off x="581808" y="4340180"/>
+            <a:ext cx="10987340" cy="1700696"/>
+          </a:xfrm>
+        </p:spPr>
+        <p:txBody>
+          <a:bodyPr/>
+          <a:lstStyle/>
+          <a:p>
+            <a:r>
+              <a:rPr lang="en-US" altLang="ko-KR" dirty="0">
+                <a:latin typeface="+mn-ea"/>
+              </a:rPr>
+              <a:t>Handle unterminated str and char const w/o generating errors or warnings</a:t>
+            </a:r>
+          </a:p>
+          <a:p>
+            <a:r>
+              <a:rPr lang="en-US" altLang="ko-KR" dirty="0">
+                <a:latin typeface="+mn-ea"/>
+              </a:rPr>
+              <a:t>A C compiler would incur an error (newline character in a string constant)</a:t>
+            </a:r>
+            <a:endParaRPr lang="en-US" altLang="ko-KR" dirty="0">
+              <a:solidFill>
+                <a:schemeClr val="tx1"/>
+              </a:solidFill>
+              <a:latin typeface="+mn-ea"/>
+            </a:endParaRPr>
+          </a:p>
+          <a:p>
+            <a:pPr lvl="1"/>
+            <a:r>
+              <a:rPr lang="en-US" altLang="ko-KR" dirty="0">
+                <a:solidFill>
+                  <a:schemeClr val="tx1"/>
+                </a:solidFill>
+                <a:latin typeface="+mn-ea"/>
+              </a:rPr>
+              <a:t>But many C preprocessors would not</a:t>
+            </a:r>
+          </a:p>
+          <a:p>
+            <a:pPr lvl="1"/>
+            <a:r>
+              <a:rPr lang="en-US" altLang="ko-KR" dirty="0">
+                <a:latin typeface="+mn-ea"/>
+              </a:rPr>
+              <a:t>And your program should not either</a:t>
+            </a:r>
+            <a:endParaRPr lang="en-US" altLang="ko-KR" dirty="0">
+              <a:solidFill>
+                <a:schemeClr val="tx1"/>
+              </a:solidFill>
+              <a:latin typeface="+mn-ea"/>
+            </a:endParaRPr>
+          </a:p>
+        </p:txBody>
+      </p:sp>
+      <p:graphicFrame>
+        <p:nvGraphicFramePr>
+          <p:cNvPr id="22" name="표 21">
+            <a:extLst>
+              <a:ext uri="{FF2B5EF4-FFF2-40B4-BE49-F238E27FC236}">
+                <a16:creationId xmlns:a16="http://schemas.microsoft.com/office/drawing/2014/main" id="{105F894E-E23B-7E1D-A47D-1AC282F25A32}"/>
+              </a:ext>
+            </a:extLst>
+          </p:cNvPr>
+          <p:cNvGraphicFramePr>
+            <a:graphicFrameLocks noGrp="1"/>
+          </p:cNvGraphicFramePr>
+          <p:nvPr>
+            <p:extLst>
+              <p:ext uri="{D42A27DB-BD31-4B8C-83A1-F6EECF244321}">
+                <p14:modId xmlns:p14="http://schemas.microsoft.com/office/powerpoint/2010/main" val="1507073560"/>
+              </p:ext>
+            </p:extLst>
+          </p:nvPr>
+        </p:nvGraphicFramePr>
+        <p:xfrm>
+          <a:off x="567087" y="1048463"/>
+          <a:ext cx="11057825" cy="2990305"/>
+        </p:xfrm>
+        <a:graphic>
+          <a:graphicData uri="http://schemas.openxmlformats.org/drawingml/2006/table">
+            <a:tbl>
+              <a:tblPr firstRow="1" bandRow="1">
+                <a:tableStyleId>{5C22544A-7EE6-4342-B048-85BDC9FD1C3A}</a:tableStyleId>
+              </a:tblPr>
+              <a:tblGrid>
+                <a:gridCol w="1366253">
+                  <a:extLst>
+                    <a:ext uri="{9D8B030D-6E8A-4147-A177-3AD203B41FA5}">
+                      <a16:colId xmlns:a16="http://schemas.microsoft.com/office/drawing/2014/main" val="2682864544"/>
+                    </a:ext>
+                  </a:extLst>
+                </a:gridCol>
+                <a:gridCol w="4055752">
+                  <a:extLst>
+                    <a:ext uri="{9D8B030D-6E8A-4147-A177-3AD203B41FA5}">
+                      <a16:colId xmlns:a16="http://schemas.microsoft.com/office/drawing/2014/main" val="2891475324"/>
+                    </a:ext>
+                  </a:extLst>
+                </a:gridCol>
+                <a:gridCol w="4018209">
+                  <a:extLst>
+                    <a:ext uri="{9D8B030D-6E8A-4147-A177-3AD203B41FA5}">
+                      <a16:colId xmlns:a16="http://schemas.microsoft.com/office/drawing/2014/main" val="163360775"/>
+                    </a:ext>
+                  </a:extLst>
+                </a:gridCol>
+                <a:gridCol w="1617611">
+                  <a:extLst>
+                    <a:ext uri="{9D8B030D-6E8A-4147-A177-3AD203B41FA5}">
+                      <a16:colId xmlns:a16="http://schemas.microsoft.com/office/drawing/2014/main" val="3459507647"/>
+                    </a:ext>
+                  </a:extLst>
+                </a:gridCol>
+              </a:tblGrid>
+              <a:tr h="671669">
+                <a:tc>
+                  <a:txBody>
+                    <a:bodyPr/>
+                    <a:lstStyle/>
+                    <a:p>
+                      <a:pPr marL="0" marR="0" lvl="0" indent="0" algn="ctr" defTabSz="914377" rtl="0" eaLnBrk="1" fontAlgn="auto" latinLnBrk="1" hangingPunct="1">
+                        <a:lnSpc>
+                          <a:spcPct val="100000"/>
+                        </a:lnSpc>
+                        <a:spcBef>
+                          <a:spcPts val="0"/>
+                        </a:spcBef>
+                        <a:spcAft>
+                          <a:spcPts val="0"/>
+                        </a:spcAft>
+                        <a:buClrTx/>
+                        <a:buSzTx/>
+                        <a:buFontTx/>
+                        <a:buNone/>
+                        <a:tabLst/>
+                        <a:defRPr/>
+                      </a:pPr>
+                      <a:r>
+                        <a:rPr lang="en-US" altLang="ko-KR" b="0" dirty="0">
+                          <a:latin typeface="+mn-ea"/>
+                          <a:ea typeface="+mn-ea"/>
+                        </a:rPr>
+                        <a:t>Case</a:t>
+                      </a:r>
+                      <a:endParaRPr lang="ko-KR" altLang="en-US" b="0" dirty="0">
+                        <a:latin typeface="+mn-ea"/>
+                        <a:ea typeface="+mn-ea"/>
+                      </a:endParaRPr>
+                    </a:p>
+                  </a:txBody>
+                  <a:tcPr anchor="ctr"/>
+                </a:tc>
+                <a:tc>
+                  <a:txBody>
+                    <a:bodyPr/>
+                    <a:lstStyle/>
+                    <a:p>
+                      <a:pPr marL="0" marR="0" lvl="0" indent="0" algn="ctr" defTabSz="914377" rtl="0" eaLnBrk="1" fontAlgn="auto" latinLnBrk="1" hangingPunct="1">
+                        <a:lnSpc>
+                          <a:spcPct val="100000"/>
+                        </a:lnSpc>
+                        <a:spcBef>
+                          <a:spcPts val="0"/>
+                        </a:spcBef>
+                        <a:spcAft>
+                          <a:spcPts val="0"/>
+                        </a:spcAft>
+                        <a:buClrTx/>
+                        <a:buSzTx/>
+                        <a:buFontTx/>
+                        <a:buNone/>
+                        <a:tabLst/>
+                        <a:defRPr/>
+                      </a:pPr>
+                      <a:r>
+                        <a:rPr lang="en-US" altLang="ko-KR" b="0">
+                          <a:latin typeface="+mn-ea"/>
+                          <a:ea typeface="+mn-ea"/>
+                        </a:rPr>
+                        <a:t>Standard Input Stream</a:t>
+                      </a:r>
+                      <a:endParaRPr lang="ko-KR" altLang="en-US" b="0" dirty="0">
+                        <a:latin typeface="+mn-ea"/>
+                        <a:ea typeface="+mn-ea"/>
+                      </a:endParaRPr>
+                    </a:p>
+                  </a:txBody>
+                  <a:tcPr anchor="ctr"/>
+                </a:tc>
+                <a:tc>
+                  <a:txBody>
+                    <a:bodyPr/>
+                    <a:lstStyle/>
+                    <a:p>
+                      <a:pPr marL="0" marR="0" lvl="0" indent="0" algn="ctr" defTabSz="914377" rtl="0" eaLnBrk="1" fontAlgn="auto" latinLnBrk="1" hangingPunct="1">
+                        <a:lnSpc>
+                          <a:spcPct val="100000"/>
+                        </a:lnSpc>
+                        <a:spcBef>
+                          <a:spcPts val="0"/>
+                        </a:spcBef>
+                        <a:spcAft>
+                          <a:spcPts val="0"/>
+                        </a:spcAft>
+                        <a:buClrTx/>
+                        <a:buSzTx/>
+                        <a:buFontTx/>
+                        <a:buNone/>
+                        <a:tabLst/>
+                        <a:defRPr/>
+                      </a:pPr>
+                      <a:r>
+                        <a:rPr lang="en-US" altLang="ko-KR" b="0">
+                          <a:latin typeface="+mn-ea"/>
+                          <a:ea typeface="+mn-ea"/>
+                        </a:rPr>
+                        <a:t>Standard Output Stream</a:t>
+                      </a:r>
+                      <a:endParaRPr lang="ko-KR" altLang="en-US" b="0" dirty="0">
+                        <a:latin typeface="+mn-ea"/>
+                        <a:ea typeface="+mn-ea"/>
+                      </a:endParaRPr>
+                    </a:p>
+                  </a:txBody>
+                  <a:tcPr anchor="ctr"/>
+                </a:tc>
+                <a:tc>
+                  <a:txBody>
+                    <a:bodyPr/>
+                    <a:lstStyle/>
+                    <a:p>
+                      <a:pPr marL="0" marR="0" lvl="0" indent="0" algn="ctr" defTabSz="914377" rtl="0" eaLnBrk="1" fontAlgn="auto" latinLnBrk="1" hangingPunct="1">
+                        <a:lnSpc>
+                          <a:spcPct val="100000"/>
+                        </a:lnSpc>
+                        <a:spcBef>
+                          <a:spcPts val="0"/>
+                        </a:spcBef>
+                        <a:spcAft>
+                          <a:spcPts val="0"/>
+                        </a:spcAft>
+                        <a:buClrTx/>
+                        <a:buSzTx/>
+                        <a:buFontTx/>
+                        <a:buNone/>
+                        <a:tabLst/>
+                        <a:defRPr/>
+                      </a:pPr>
+                      <a:r>
+                        <a:rPr lang="en-US" altLang="ko-KR" b="0">
+                          <a:latin typeface="+mn-ea"/>
+                          <a:ea typeface="+mn-ea"/>
+                        </a:rPr>
+                        <a:t>Standard Error Stream</a:t>
+                      </a:r>
+                      <a:endParaRPr lang="ko-KR" altLang="en-US" b="0" dirty="0">
+                        <a:latin typeface="+mn-ea"/>
+                        <a:ea typeface="+mn-ea"/>
+                      </a:endParaRPr>
+                    </a:p>
+                  </a:txBody>
+                  <a:tcPr anchor="ctr"/>
+                </a:tc>
+                <a:extLst>
+                  <a:ext uri="{0D108BD9-81ED-4DB2-BD59-A6C34878D82A}">
+                    <a16:rowId xmlns:a16="http://schemas.microsoft.com/office/drawing/2014/main" val="1272094073"/>
+                  </a:ext>
+                </a:extLst>
+              </a:tr>
+              <a:tr h="1159318">
+                <a:tc>
+                  <a:txBody>
+                    <a:bodyPr/>
+                    <a:lstStyle/>
+                    <a:p>
+                      <a:pPr marL="0" marR="0" lvl="0" indent="0" algn="ctr" defTabSz="914377" rtl="0" eaLnBrk="1" fontAlgn="auto" latinLnBrk="1" hangingPunct="1">
+                        <a:lnSpc>
+                          <a:spcPct val="100000"/>
+                        </a:lnSpc>
+                        <a:spcBef>
+                          <a:spcPts val="0"/>
+                        </a:spcBef>
+                        <a:spcAft>
+                          <a:spcPts val="0"/>
+                        </a:spcAft>
+                        <a:buClrTx/>
+                        <a:buSzTx/>
+                        <a:buFontTx/>
+                        <a:buNone/>
+                        <a:tabLst/>
+                        <a:defRPr/>
+                      </a:pPr>
+                      <a:r>
+                        <a:rPr lang="en-US" altLang="ko-KR" sz="1800">
+                          <a:latin typeface="+mn-ea"/>
+                          <a:ea typeface="+mn-ea"/>
+                        </a:rPr>
+                        <a:t>Part of the string</a:t>
+                      </a:r>
+                      <a:endParaRPr lang="ko-KR" altLang="en-US" sz="1800" dirty="0">
+                        <a:latin typeface="+mn-ea"/>
+                        <a:ea typeface="+mn-ea"/>
+                      </a:endParaRPr>
+                    </a:p>
+                  </a:txBody>
+                  <a:tcPr anchor="ctr"/>
+                </a:tc>
+                <a:tc>
+                  <a:txBody>
+                    <a:bodyPr/>
+                    <a:lstStyle/>
+                    <a:p>
+                      <a:pPr algn="ctr"/>
+                      <a:r>
+                        <a:rPr lang="en-US" altLang="ko-KR" sz="2800" dirty="0" err="1">
+                          <a:latin typeface="+mn-ea"/>
+                          <a:ea typeface="+mn-ea"/>
+                        </a:rPr>
+                        <a:t>abc"def</a:t>
+                      </a:r>
+                      <a:r>
+                        <a:rPr lang="en-US" altLang="ko-KR" sz="2800" dirty="0">
+                          <a:latin typeface="+mn-ea"/>
+                          <a:ea typeface="+mn-ea"/>
+                        </a:rPr>
+                        <a:t>/*</a:t>
+                      </a:r>
+                      <a:r>
+                        <a:rPr lang="en-US" altLang="ko-KR" sz="2800" dirty="0" err="1">
+                          <a:latin typeface="+mn-ea"/>
+                          <a:ea typeface="+mn-ea"/>
+                        </a:rPr>
+                        <a:t>ghi</a:t>
+                      </a:r>
+                      <a:r>
+                        <a:rPr lang="en-US" altLang="ko-KR" sz="2800" dirty="0">
+                          <a:latin typeface="+mn-ea"/>
+                          <a:ea typeface="+mn-ea"/>
+                        </a:rPr>
+                        <a:t>*/</a:t>
+                      </a:r>
+                      <a:r>
+                        <a:rPr lang="en-US" altLang="ko-KR" sz="2800" dirty="0" err="1">
+                          <a:latin typeface="+mn-ea"/>
+                          <a:ea typeface="+mn-ea"/>
+                        </a:rPr>
+                        <a:t>jkl</a:t>
+                      </a:r>
+                      <a:r>
+                        <a:rPr lang="en-US" altLang="ko-KR" sz="2800" baseline="-25000" dirty="0" err="1">
+                          <a:latin typeface="+mn-ea"/>
+                          <a:ea typeface="+mn-ea"/>
+                        </a:rPr>
+                        <a:t>n</a:t>
+                      </a:r>
+                      <a:endParaRPr lang="ko-KR" altLang="en-US" sz="2800" dirty="0">
+                        <a:latin typeface="+mn-ea"/>
+                        <a:ea typeface="+mn-ea"/>
+                      </a:endParaRPr>
+                    </a:p>
+                  </a:txBody>
+                  <a:tcPr anchor="ctr"/>
+                </a:tc>
+                <a:tc>
+                  <a:txBody>
+                    <a:bodyPr/>
+                    <a:lstStyle/>
+                    <a:p>
+                      <a:pPr algn="ctr"/>
+                      <a:r>
+                        <a:rPr lang="en-US" altLang="ko-KR" sz="2800" dirty="0" err="1">
+                          <a:latin typeface="+mn-ea"/>
+                          <a:ea typeface="+mn-ea"/>
+                        </a:rPr>
+                        <a:t>abc"def</a:t>
+                      </a:r>
+                      <a:r>
+                        <a:rPr lang="en-US" altLang="ko-KR" sz="2800" dirty="0">
+                          <a:latin typeface="+mn-ea"/>
+                          <a:ea typeface="+mn-ea"/>
+                        </a:rPr>
+                        <a:t>/*</a:t>
+                      </a:r>
+                      <a:r>
+                        <a:rPr lang="en-US" altLang="ko-KR" sz="2800" dirty="0" err="1">
+                          <a:latin typeface="+mn-ea"/>
+                          <a:ea typeface="+mn-ea"/>
+                        </a:rPr>
+                        <a:t>ghi</a:t>
+                      </a:r>
+                      <a:r>
+                        <a:rPr lang="en-US" altLang="ko-KR" sz="2800" dirty="0">
+                          <a:latin typeface="+mn-ea"/>
+                          <a:ea typeface="+mn-ea"/>
+                        </a:rPr>
+                        <a:t>*/</a:t>
+                      </a:r>
+                      <a:r>
+                        <a:rPr lang="en-US" altLang="ko-KR" sz="2800" dirty="0" err="1">
+                          <a:latin typeface="+mn-ea"/>
+                          <a:ea typeface="+mn-ea"/>
+                        </a:rPr>
+                        <a:t>jkl</a:t>
+                      </a:r>
+                      <a:r>
+                        <a:rPr lang="en-US" altLang="ko-KR" sz="2800" baseline="-25000" dirty="0" err="1">
+                          <a:latin typeface="+mn-ea"/>
+                          <a:ea typeface="+mn-ea"/>
+                        </a:rPr>
+                        <a:t>n</a:t>
+                      </a:r>
+                      <a:endParaRPr lang="ko-KR" altLang="en-US" sz="2800" dirty="0">
+                        <a:latin typeface="+mn-ea"/>
+                        <a:ea typeface="+mn-ea"/>
+                      </a:endParaRPr>
+                    </a:p>
+                  </a:txBody>
+                  <a:tcPr anchor="ctr"/>
+                </a:tc>
+                <a:tc>
+                  <a:txBody>
+                    <a:bodyPr/>
+                    <a:lstStyle/>
+                    <a:p>
+                      <a:pPr algn="ctr" latinLnBrk="1"/>
+                      <a:endParaRPr lang="ko-KR" altLang="en-US" sz="3600" dirty="0">
+                        <a:latin typeface="+mn-ea"/>
+                        <a:ea typeface="+mn-ea"/>
+                      </a:endParaRPr>
+                    </a:p>
+                  </a:txBody>
+                  <a:tcPr anchor="ctr"/>
+                </a:tc>
+                <a:extLst>
+                  <a:ext uri="{0D108BD9-81ED-4DB2-BD59-A6C34878D82A}">
+                    <a16:rowId xmlns:a16="http://schemas.microsoft.com/office/drawing/2014/main" val="966249997"/>
+                  </a:ext>
+                </a:extLst>
+              </a:tr>
+              <a:tr h="1159318">
+                <a:tc>
+                  <a:txBody>
+                    <a:bodyPr/>
+                    <a:lstStyle/>
+                    <a:p>
+                      <a:pPr marL="0" marR="0" lvl="0" indent="0" algn="ctr" defTabSz="914377" rtl="0" eaLnBrk="1" fontAlgn="auto" latinLnBrk="1" hangingPunct="1">
+                        <a:lnSpc>
+                          <a:spcPct val="100000"/>
+                        </a:lnSpc>
+                        <a:spcBef>
+                          <a:spcPts val="0"/>
+                        </a:spcBef>
+                        <a:spcAft>
+                          <a:spcPts val="0"/>
+                        </a:spcAft>
+                        <a:buClrTx/>
+                        <a:buSzTx/>
+                        <a:buFontTx/>
+                        <a:buNone/>
+                        <a:tabLst/>
+                        <a:defRPr/>
+                      </a:pPr>
+                      <a:r>
+                        <a:rPr lang="en-US" altLang="ko-KR" sz="1800">
+                          <a:latin typeface="+mn-ea"/>
+                          <a:ea typeface="+mn-ea"/>
+                        </a:rPr>
+                        <a:t>Part of the character constant</a:t>
+                      </a:r>
+                      <a:endParaRPr lang="ko-KR" altLang="en-US" sz="1800" dirty="0">
+                        <a:latin typeface="+mn-ea"/>
+                        <a:ea typeface="+mn-ea"/>
+                      </a:endParaRPr>
+                    </a:p>
+                  </a:txBody>
+                  <a:tcPr anchor="ctr"/>
+                </a:tc>
+                <a:tc>
+                  <a:txBody>
+                    <a:bodyPr/>
+                    <a:lstStyle/>
+                    <a:p>
+                      <a:pPr algn="ctr"/>
+                      <a:r>
+                        <a:rPr lang="en-US" altLang="ko-KR" sz="2800" dirty="0" err="1">
+                          <a:latin typeface="+mn-ea"/>
+                          <a:ea typeface="+mn-ea"/>
+                        </a:rPr>
+                        <a:t>abc'def</a:t>
+                      </a:r>
+                      <a:r>
+                        <a:rPr lang="en-US" altLang="ko-KR" sz="2800" dirty="0">
+                          <a:latin typeface="+mn-ea"/>
+                          <a:ea typeface="+mn-ea"/>
+                        </a:rPr>
+                        <a:t>/*</a:t>
+                      </a:r>
+                      <a:r>
+                        <a:rPr lang="en-US" altLang="ko-KR" sz="2800" dirty="0" err="1">
+                          <a:latin typeface="+mn-ea"/>
+                          <a:ea typeface="+mn-ea"/>
+                        </a:rPr>
+                        <a:t>ghi</a:t>
+                      </a:r>
+                      <a:r>
+                        <a:rPr lang="en-US" altLang="ko-KR" sz="2800" dirty="0">
+                          <a:latin typeface="+mn-ea"/>
+                          <a:ea typeface="+mn-ea"/>
+                        </a:rPr>
+                        <a:t>*/</a:t>
+                      </a:r>
+                      <a:r>
+                        <a:rPr lang="en-US" altLang="ko-KR" sz="2800" dirty="0" err="1">
+                          <a:latin typeface="+mn-ea"/>
+                          <a:ea typeface="+mn-ea"/>
+                        </a:rPr>
+                        <a:t>jkl</a:t>
+                      </a:r>
+                      <a:r>
+                        <a:rPr lang="en-US" altLang="ko-KR" sz="2800" baseline="-25000" dirty="0" err="1">
+                          <a:latin typeface="+mn-ea"/>
+                          <a:ea typeface="+mn-ea"/>
+                        </a:rPr>
+                        <a:t>n</a:t>
+                      </a:r>
+                      <a:endParaRPr lang="ko-KR" altLang="en-US" sz="2800" dirty="0">
+                        <a:latin typeface="+mn-ea"/>
+                        <a:ea typeface="+mn-ea"/>
+                      </a:endParaRPr>
+                    </a:p>
+                  </a:txBody>
+                  <a:tcPr anchor="ctr"/>
+                </a:tc>
+                <a:tc>
+                  <a:txBody>
+                    <a:bodyPr/>
+                    <a:lstStyle/>
+                    <a:p>
+                      <a:pPr algn="ctr"/>
+                      <a:r>
+                        <a:rPr lang="en-US" altLang="ko-KR" sz="2800" dirty="0" err="1">
+                          <a:latin typeface="+mn-ea"/>
+                          <a:ea typeface="+mn-ea"/>
+                        </a:rPr>
+                        <a:t>abc'def</a:t>
+                      </a:r>
+                      <a:r>
+                        <a:rPr lang="en-US" altLang="ko-KR" sz="2800" dirty="0">
+                          <a:latin typeface="+mn-ea"/>
+                          <a:ea typeface="+mn-ea"/>
+                        </a:rPr>
+                        <a:t>/*</a:t>
+                      </a:r>
+                      <a:r>
+                        <a:rPr lang="en-US" altLang="ko-KR" sz="2800" dirty="0" err="1">
+                          <a:latin typeface="+mn-ea"/>
+                          <a:ea typeface="+mn-ea"/>
+                        </a:rPr>
+                        <a:t>ghi</a:t>
+                      </a:r>
+                      <a:r>
+                        <a:rPr lang="en-US" altLang="ko-KR" sz="2800" dirty="0">
+                          <a:latin typeface="+mn-ea"/>
+                          <a:ea typeface="+mn-ea"/>
+                        </a:rPr>
+                        <a:t>*/</a:t>
+                      </a:r>
+                      <a:r>
+                        <a:rPr lang="en-US" altLang="ko-KR" sz="2800" dirty="0" err="1">
+                          <a:latin typeface="+mn-ea"/>
+                          <a:ea typeface="+mn-ea"/>
+                        </a:rPr>
+                        <a:t>jkl</a:t>
+                      </a:r>
+                      <a:r>
+                        <a:rPr lang="en-US" altLang="ko-KR" sz="2800" baseline="-25000" dirty="0" err="1">
+                          <a:latin typeface="+mn-ea"/>
+                          <a:ea typeface="+mn-ea"/>
+                        </a:rPr>
+                        <a:t>n</a:t>
+                      </a:r>
+                      <a:endParaRPr lang="ko-KR" altLang="en-US" sz="2800" dirty="0">
+                        <a:latin typeface="+mn-ea"/>
+                        <a:ea typeface="+mn-ea"/>
+                      </a:endParaRPr>
+                    </a:p>
+                  </a:txBody>
+                  <a:tcPr anchor="ctr"/>
+                </a:tc>
+                <a:tc>
+                  <a:txBody>
+                    <a:bodyPr/>
+                    <a:lstStyle/>
+                    <a:p>
+                      <a:pPr algn="ctr" latinLnBrk="1"/>
+                      <a:endParaRPr lang="ko-KR" altLang="en-US" sz="3600" dirty="0">
+                        <a:latin typeface="+mn-ea"/>
+                        <a:ea typeface="+mn-ea"/>
+                      </a:endParaRPr>
+                    </a:p>
+                  </a:txBody>
+                  <a:tcPr anchor="ctr"/>
+                </a:tc>
+                <a:extLst>
+                  <a:ext uri="{0D108BD9-81ED-4DB2-BD59-A6C34878D82A}">
+                    <a16:rowId xmlns:a16="http://schemas.microsoft.com/office/drawing/2014/main" val="3420706579"/>
+                  </a:ext>
+                </a:extLst>
+              </a:tr>
+            </a:tbl>
+          </a:graphicData>
+        </a:graphic>
+      </p:graphicFrame>
+    </p:spTree>
+    <p:extLst>
+      <p:ext uri="{BB962C8B-B14F-4D97-AF65-F5344CB8AC3E}">
+        <p14:creationId xmlns:p14="http://schemas.microsoft.com/office/powerpoint/2010/main" val="1587695275"/>
+      </p:ext>
+    </p:extLst>
+  </p:cSld>
+  <p:clrMapOvr>
+    <a:masterClrMapping/>
+  </p:clrMapOvr>
+</p:sld>
+</file>
+
+<file path=ppt/slides/slide11.xml><?xml version="1.0" encoding="utf-8"?>
+<p:sld xmlns:a="http://schemas.openxmlformats.org/drawingml/2006/main" xmlns:r="http://schemas.openxmlformats.org/officeDocument/2006/relationships" xmlns:p="http://schemas.openxmlformats.org/presentationml/2006/main">
+  <p:cSld>
+    <p:spTree>
+      <p:nvGrpSpPr>
+        <p:cNvPr id="1" name="">
+          <a:extLst>
+            <a:ext uri="{FF2B5EF4-FFF2-40B4-BE49-F238E27FC236}">
               <a16:creationId xmlns:a16="http://schemas.microsoft.com/office/drawing/2014/main" id="{04D0652F-E5D3-46C4-27C1-2F33A244E3B7}"/>
             </a:ext>
           </a:extLst>
@@ -4184,7 +5060,7 @@
             <a:fld id="{3D16D23B-24D6-455E-BBD7-6975BEA16FD4}" type="slidenum">
               <a:rPr lang="ko-KR" altLang="en-US" smtClean="0"/>
               <a:pPr/>
-              <a:t>10</a:t>
+              <a:t>11</a:t>
             </a:fld>
             <a:r>
               <a:rPr lang="en-US" altLang="ko-KR" dirty="0"/>
@@ -4224,7 +5100,7 @@
               <a:rPr lang="en-US" altLang="ko-KR" sz="2800" dirty="0">
                 <a:latin typeface="+mj-ea"/>
               </a:rPr>
-              <a:t>Requirements – Error: EOF Before a Comment Is Terminated (7/8)</a:t>
+              <a:t>Requirements – Error: EOF Before a Comment Is Terminated (8/9)</a:t>
             </a:r>
             <a:endParaRPr lang="ko-KR" altLang="en-US" sz="2800" dirty="0">
               <a:latin typeface="+mj-ea"/>
@@ -4250,7 +5126,7 @@
         </p:nvSpPr>
         <p:spPr>
           <a:xfrm>
-            <a:off x="581808" y="4340180"/>
+            <a:off x="545519" y="3998435"/>
             <a:ext cx="10987340" cy="1700696"/>
           </a:xfrm>
         </p:spPr>
@@ -4260,22 +5136,20 @@
           <a:p>
             <a:r>
               <a:rPr lang="en-US" altLang="ko-KR" dirty="0">
-                <a:solidFill>
-                  <a:schemeClr val="tx1"/>
-                </a:solidFill>
-              </a:rPr>
-              <a:t>In the following examples,</a:t>
-            </a:r>
-          </a:p>
-          <a:p>
-            <a:pPr lvl="1"/>
+                <a:latin typeface="+mn-ea"/>
+              </a:rPr>
+              <a:t>Include the line number where the comment starts in the error message</a:t>
+            </a:r>
+          </a:p>
+          <a:p>
             <a:r>
               <a:rPr lang="en-US" altLang="ko-KR" dirty="0">
                 <a:solidFill>
                   <a:schemeClr val="tx1"/>
                 </a:solidFill>
-              </a:rPr>
-              <a:t> “s”: a space character </a:t>
+                <a:latin typeface="+mn-ea"/>
+              </a:rPr>
+              <a:t>Return EXIT_FAILURE when an unterminated comment was detected</a:t>
             </a:r>
           </a:p>
           <a:p>
@@ -4285,8 +5159,66 @@
                 <a:solidFill>
                   <a:schemeClr val="tx1"/>
                 </a:solidFill>
-              </a:rPr>
-              <a:t> “n”: a newline character</a:t>
+                <a:latin typeface="+mn-ea"/>
+              </a:rPr>
+              <a:t>Except for this case, you should return EXIT_SUCCESS in all other cases</a:t>
+            </a:r>
+          </a:p>
+          <a:p>
+            <a:pPr lvl="1"/>
+            <a:r>
+              <a:rPr lang="en-US" altLang="ko-KR" dirty="0">
+                <a:solidFill>
+                  <a:schemeClr val="tx1"/>
+                </a:solidFill>
+                <a:latin typeface="+mn-ea"/>
+              </a:rPr>
+              <a:t>EXIT_FAILURE and EXIT_SUCCESS are defined as macros in </a:t>
+            </a:r>
+            <a:r>
+              <a:rPr lang="en-US" altLang="ko-KR" dirty="0" err="1">
+                <a:solidFill>
+                  <a:schemeClr val="tx1"/>
+                </a:solidFill>
+                <a:latin typeface="+mn-ea"/>
+              </a:rPr>
+              <a:t>stdlib.h</a:t>
+            </a:r>
+            <a:endParaRPr lang="en-US" altLang="ko-KR" dirty="0">
+              <a:solidFill>
+                <a:schemeClr val="tx1"/>
+              </a:solidFill>
+              <a:latin typeface="+mn-ea"/>
+            </a:endParaRPr>
+          </a:p>
+          <a:p>
+            <a:pPr lvl="1"/>
+            <a:r>
+              <a:rPr lang="en-US" altLang="ko-KR" dirty="0">
+                <a:solidFill>
+                  <a:schemeClr val="tx1"/>
+                </a:solidFill>
+                <a:latin typeface="+mn-ea"/>
+              </a:rPr>
+              <a:t>so add #include &lt;</a:t>
+            </a:r>
+            <a:r>
+              <a:rPr lang="en-US" altLang="ko-KR" dirty="0" err="1">
+                <a:solidFill>
+                  <a:schemeClr val="tx1"/>
+                </a:solidFill>
+                <a:latin typeface="+mn-ea"/>
+              </a:rPr>
+              <a:t>stdlib.h</a:t>
+            </a:r>
+            <a:r>
+              <a:rPr lang="en-US" altLang="ko-KR" dirty="0">
+                <a:solidFill>
+                  <a:schemeClr val="tx1"/>
+                </a:solidFill>
+                <a:latin typeface="+mn-ea"/>
+              </a:rPr>
+              <a:t>&gt; to your C code</a:t>
             </a:r>
           </a:p>
         </p:txBody>
@@ -4306,14 +5238,14 @@
           <p:nvPr>
             <p:extLst>
               <p:ext uri="{D42A27DB-BD31-4B8C-83A1-F6EECF244321}">
-                <p14:modId xmlns:p14="http://schemas.microsoft.com/office/powerpoint/2010/main" val="2040919448"/>
+                <p14:modId xmlns:p14="http://schemas.microsoft.com/office/powerpoint/2010/main" val="321160850"/>
               </p:ext>
             </p:extLst>
           </p:nvPr>
         </p:nvGraphicFramePr>
         <p:xfrm>
           <a:off x="545519" y="1546467"/>
-          <a:ext cx="11059917" cy="1994296"/>
+          <a:ext cx="11175426" cy="1994296"/>
         </p:xfrm>
         <a:graphic>
           <a:graphicData uri="http://schemas.openxmlformats.org/drawingml/2006/table">
@@ -4322,21 +5254,21 @@
                 <a:tableStyleId>{5C22544A-7EE6-4342-B048-85BDC9FD1C3A}</a:tableStyleId>
               </a:tblPr>
               <a:tblGrid>
-                <a:gridCol w="2760106">
+                <a:gridCol w="2714917">
                   <a:extLst>
                     <a:ext uri="{9D8B030D-6E8A-4147-A177-3AD203B41FA5}">
                       <a16:colId xmlns:a16="http://schemas.microsoft.com/office/drawing/2014/main" val="2891475324"/>
                     </a:ext>
                   </a:extLst>
                 </a:gridCol>
-                <a:gridCol w="2897746">
+                <a:gridCol w="2854037">
                   <a:extLst>
                     <a:ext uri="{9D8B030D-6E8A-4147-A177-3AD203B41FA5}">
                       <a16:colId xmlns:a16="http://schemas.microsoft.com/office/drawing/2014/main" val="163360775"/>
                     </a:ext>
                   </a:extLst>
                 </a:gridCol>
-                <a:gridCol w="5402065">
+                <a:gridCol w="5606472">
                   <a:extLst>
                     <a:ext uri="{9D8B030D-6E8A-4147-A177-3AD203B41FA5}">
                       <a16:colId xmlns:a16="http://schemas.microsoft.com/office/drawing/2014/main" val="3459507647"/>
@@ -4704,7 +5636,7 @@
 </p:sld>
 </file>
 
-<file path=ppt/slides/slide11.xml><?xml version="1.0" encoding="utf-8"?>
+<file path=ppt/slides/slide12.xml><?xml version="1.0" encoding="utf-8"?>
 <p:sld xmlns:a="http://schemas.openxmlformats.org/drawingml/2006/main" xmlns:r="http://schemas.openxmlformats.org/officeDocument/2006/relationships" xmlns:p="http://schemas.openxmlformats.org/presentationml/2006/main">
   <p:cSld>
     <p:spTree>
@@ -4755,7 +5687,7 @@
             <a:fld id="{3D16D23B-24D6-455E-BBD7-6975BEA16FD4}" type="slidenum">
               <a:rPr lang="ko-KR" altLang="en-US" smtClean="0"/>
               <a:pPr/>
-              <a:t>11</a:t>
+              <a:t>12</a:t>
             </a:fld>
             <a:r>
               <a:rPr lang="en-US" altLang="ko-KR" dirty="0"/>
@@ -4795,7 +5727,7 @@
               <a:rPr lang="en-US" altLang="ko-KR" dirty="0">
                 <a:latin typeface="+mj-ea"/>
               </a:rPr>
-              <a:t>Requirements – Miscellaneous Features (8/8)</a:t>
+              <a:t>Requirements – Miscellaneous Features (9/9)</a:t>
             </a:r>
             <a:endParaRPr lang="ko-KR" altLang="en-US" dirty="0">
               <a:latin typeface="+mj-ea"/>
@@ -4836,11 +5768,10 @@
                 </a:solidFill>
                 <a:latin typeface="+mn-ea"/>
               </a:rPr>
-              <a:t>Return value</a:t>
-            </a:r>
-          </a:p>
-          <a:p>
-            <a:pPr lvl="1"/>
+              <a:t>Your program should work for standard input lines of any length</a:t>
+            </a:r>
+          </a:p>
+          <a:p>
             <a:r>
               <a:rPr lang="en-US" altLang="ko-KR" dirty="0">
                 <a:solidFill>
@@ -4848,7 +5779,7 @@
                 </a:solidFill>
                 <a:latin typeface="+mn-ea"/>
               </a:rPr>
-              <a:t>Return EXIT_FAILURE when an unterminated comment was detected</a:t>
+              <a:t>You may assume that the final line of the standard input stream ends with a newline character</a:t>
             </a:r>
           </a:p>
           <a:p>
@@ -4859,10 +5790,11 @@
                 </a:solidFill>
                 <a:latin typeface="+mn-ea"/>
               </a:rPr>
-              <a:t>Your program should work for standard input lines of any length</a:t>
-            </a:r>
-          </a:p>
-          <a:p>
+              <a:t>Backslash-newline character sequence does not occur in the standard input stream</a:t>
+            </a:r>
+          </a:p>
+          <a:p>
+            <a:pPr lvl="1"/>
             <a:r>
               <a:rPr lang="en-US" altLang="ko-KR" dirty="0">
                 <a:solidFill>
@@ -4870,7 +5802,7 @@
                 </a:solidFill>
                 <a:latin typeface="+mn-ea"/>
               </a:rPr>
-              <a:t>You may assume that the final line of the standard input stream ends with a newline character</a:t>
+              <a:t>Logical lines == physical lines in the standard input stream</a:t>
             </a:r>
           </a:p>
           <a:p>
@@ -4881,11 +5813,10 @@
                 </a:solidFill>
                 <a:latin typeface="+mn-ea"/>
               </a:rPr>
-              <a:t>Backslash-newline character sequence does not occur in the standard input stream</a:t>
-            </a:r>
-          </a:p>
-          <a:p>
-            <a:pPr lvl="1"/>
+              <a:t>You may place all source code in a single file</a:t>
+            </a:r>
+          </a:p>
+          <a:p>
             <a:r>
               <a:rPr lang="en-US" altLang="ko-KR" dirty="0">
                 <a:solidFill>
@@ -4893,10 +5824,17 @@
                 </a:solidFill>
                 <a:latin typeface="+mn-ea"/>
               </a:rPr>
-              <a:t>Logical lines == physical lines in the standard input stream</a:t>
-            </a:r>
-          </a:p>
-          <a:p>
+              <a:t>We suggest using standard C </a:t>
+            </a:r>
+            <a:r>
+              <a:rPr lang="en-US" altLang="ko-KR" dirty="0" err="1">
+                <a:solidFill>
+                  <a:schemeClr val="tx1"/>
+                </a:solidFill>
+                <a:latin typeface="+mn-ea"/>
+              </a:rPr>
+              <a:t>getchar</a:t>
+            </a:r>
             <a:r>
               <a:rPr lang="en-US" altLang="ko-KR" dirty="0">
                 <a:solidFill>
@@ -4904,10 +5842,17 @@
                 </a:solidFill>
                 <a:latin typeface="+mn-ea"/>
               </a:rPr>
-              <a:t>You may place all source code in a single file</a:t>
-            </a:r>
-          </a:p>
-          <a:p>
+              <a:t>() function, </a:t>
+            </a:r>
+            <a:r>
+              <a:rPr lang="en-US" altLang="ko-KR" dirty="0" err="1">
+                <a:solidFill>
+                  <a:schemeClr val="tx1"/>
+                </a:solidFill>
+                <a:latin typeface="+mn-ea"/>
+              </a:rPr>
+              <a:t>fprintf</a:t>
+            </a:r>
             <a:r>
               <a:rPr lang="en-US" altLang="ko-KR" dirty="0">
                 <a:solidFill>
@@ -4915,43 +5860,7 @@
                 </a:solidFill>
                 <a:latin typeface="+mn-ea"/>
               </a:rPr>
-              <a:t>We suggest using standard C </a:t>
-            </a:r>
-            <a:r>
-              <a:rPr lang="en-US" altLang="ko-KR" dirty="0" err="1">
-                <a:solidFill>
-                  <a:schemeClr val="tx1"/>
-                </a:solidFill>
-                <a:latin typeface="+mn-ea"/>
-              </a:rPr>
-              <a:t>getchar</a:t>
-            </a:r>
-            <a:r>
-              <a:rPr lang="en-US" altLang="ko-KR" dirty="0">
-                <a:solidFill>
-                  <a:schemeClr val="tx1"/>
-                </a:solidFill>
-                <a:latin typeface="+mn-ea"/>
-              </a:rPr>
-              <a:t>() function, </a:t>
-            </a:r>
-            <a:r>
-              <a:rPr lang="en-US" altLang="ko-KR" dirty="0" err="1">
-                <a:solidFill>
-                  <a:schemeClr val="tx1"/>
-                </a:solidFill>
-                <a:latin typeface="+mn-ea"/>
-              </a:rPr>
-              <a:t>fprintf</a:t>
-            </a:r>
-            <a:r>
-              <a:rPr lang="en-US" altLang="ko-KR" dirty="0">
-                <a:solidFill>
-                  <a:schemeClr val="tx1"/>
-                </a:solidFill>
-                <a:latin typeface="+mn-ea"/>
-              </a:rPr>
-              <a:t>()</a:t>
+              <a:t>() function</a:t>
             </a:r>
           </a:p>
           <a:p>
@@ -5000,7 +5909,7 @@
 </p:sld>
 </file>
 
-<file path=ppt/slides/slide12.xml><?xml version="1.0" encoding="utf-8"?>
+<file path=ppt/slides/slide13.xml><?xml version="1.0" encoding="utf-8"?>
 <p:sld xmlns:a="http://schemas.openxmlformats.org/drawingml/2006/main" xmlns:r="http://schemas.openxmlformats.org/officeDocument/2006/relationships" xmlns:p="http://schemas.openxmlformats.org/presentationml/2006/main">
   <p:cSld>
     <p:spTree>
@@ -5051,7 +5960,7 @@
             <a:fld id="{3D16D23B-24D6-455E-BBD7-6975BEA16FD4}" type="slidenum">
               <a:rPr lang="ko-KR" altLang="en-US" smtClean="0"/>
               <a:pPr/>
-              <a:t>12</a:t>
+              <a:t>13</a:t>
             </a:fld>
             <a:r>
               <a:rPr lang="en-US" altLang="ko-KR" dirty="0"/>
@@ -5129,30 +6038,114 @@
               <a:rPr lang="en-US" altLang="ko-KR" dirty="0">
                 <a:latin typeface="+mn-ea"/>
               </a:rPr>
-              <a:t>Step 1. Design a state transition diagram</a:t>
-            </a:r>
-          </a:p>
-          <a:p>
+              <a:t>Step 1. Design a state transition diagram (dfa.pptx</a:t>
+            </a:r>
+            <a:r>
+              <a:rPr lang="ko-KR" altLang="en-US" dirty="0">
+                <a:latin typeface="+mn-ea"/>
+              </a:rPr>
+              <a:t> </a:t>
+            </a:r>
             <a:r>
               <a:rPr lang="en-US" altLang="ko-KR" dirty="0">
                 <a:latin typeface="+mn-ea"/>
               </a:rPr>
-              <a:t>Step 2. Create source code</a:t>
-            </a:r>
-          </a:p>
-          <a:p>
+              <a:t>or</a:t>
+            </a:r>
+            <a:r>
+              <a:rPr lang="ko-KR" altLang="en-US" dirty="0">
+                <a:latin typeface="+mn-ea"/>
+              </a:rPr>
+              <a:t> </a:t>
+            </a:r>
             <a:r>
               <a:rPr lang="en-US" altLang="ko-KR" dirty="0">
                 <a:latin typeface="+mn-ea"/>
               </a:rPr>
-              <a:t>Step 3. Preprocess, compile, assemble, and link</a:t>
-            </a:r>
-          </a:p>
-          <a:p>
+              <a:t>dfa.pdf</a:t>
+            </a:r>
+            <a:r>
+              <a:rPr lang="ko-KR" altLang="en-US" dirty="0">
+                <a:latin typeface="+mn-ea"/>
+              </a:rPr>
+              <a:t> </a:t>
+            </a:r>
             <a:r>
               <a:rPr lang="en-US" altLang="ko-KR" dirty="0">
                 <a:latin typeface="+mn-ea"/>
               </a:rPr>
+              <a:t>or</a:t>
+            </a:r>
+            <a:r>
+              <a:rPr lang="ko-KR" altLang="en-US" dirty="0">
+                <a:latin typeface="+mn-ea"/>
+              </a:rPr>
+              <a:t> </a:t>
+            </a:r>
+            <a:r>
+              <a:rPr lang="en-US" altLang="ko-KR" dirty="0">
+                <a:latin typeface="+mn-ea"/>
+              </a:rPr>
+              <a:t>dfa.jpg</a:t>
+            </a:r>
+            <a:r>
+              <a:rPr lang="ko-KR" altLang="en-US" dirty="0">
+                <a:latin typeface="+mn-ea"/>
+              </a:rPr>
+              <a:t> </a:t>
+            </a:r>
+            <a:r>
+              <a:rPr lang="en-US" altLang="ko-KR" dirty="0">
+                <a:latin typeface="+mn-ea"/>
+              </a:rPr>
+              <a:t>…)</a:t>
+            </a:r>
+          </a:p>
+          <a:p>
+            <a:r>
+              <a:rPr lang="en-US" altLang="ko-KR" dirty="0">
+                <a:latin typeface="+mn-ea"/>
+              </a:rPr>
+              <a:t>Step 2. Create source code (</a:t>
+            </a:r>
+            <a:r>
+              <a:rPr lang="en-US" altLang="ko-KR" dirty="0" err="1">
+                <a:latin typeface="+mn-ea"/>
+              </a:rPr>
+              <a:t>decomment.c</a:t>
+            </a:r>
+            <a:r>
+              <a:rPr lang="en-US" altLang="ko-KR" dirty="0">
+                <a:latin typeface="+mn-ea"/>
+              </a:rPr>
+              <a:t>)</a:t>
+            </a:r>
+          </a:p>
+          <a:p>
+            <a:r>
+              <a:rPr lang="en-US" altLang="ko-KR" dirty="0">
+                <a:latin typeface="+mn-ea"/>
+              </a:rPr>
+              <a:t>Step 3. Preprocess, compile, assemble, and link (</a:t>
+            </a:r>
+            <a:r>
+              <a:rPr lang="en-US" altLang="ko-KR" dirty="0" err="1">
+                <a:latin typeface="+mn-ea"/>
+              </a:rPr>
+              <a:t>decomment.i</a:t>
+            </a:r>
+            <a:r>
+              <a:rPr lang="en-US" altLang="ko-KR" dirty="0">
+                <a:latin typeface="+mn-ea"/>
+              </a:rPr>
+              <a:t>, .s, .o)</a:t>
+            </a:r>
+          </a:p>
+          <a:p>
+            <a:r>
+              <a:rPr lang="en-US" altLang="ko-KR" dirty="0">
+                <a:latin typeface="+mn-ea"/>
+              </a:rPr>
               <a:t>Step 4. Execute</a:t>
             </a:r>
           </a:p>
@@ -5161,7 +6154,7 @@
               <a:rPr lang="en-US" altLang="ko-KR" dirty="0">
                 <a:latin typeface="+mn-ea"/>
               </a:rPr>
-              <a:t>Step 5. Create a readme file</a:t>
+              <a:t>Step 5. Create a readme file (without filename extension)</a:t>
             </a:r>
           </a:p>
           <a:p>
@@ -5207,7 +6200,7 @@
 </p:sld>
 </file>
 
-<file path=ppt/slides/slide13.xml><?xml version="1.0" encoding="utf-8"?>
+<file path=ppt/slides/slide14.xml><?xml version="1.0" encoding="utf-8"?>
 <p:sld xmlns:a="http://schemas.openxmlformats.org/drawingml/2006/main" xmlns:r="http://schemas.openxmlformats.org/officeDocument/2006/relationships" xmlns:p="http://schemas.openxmlformats.org/presentationml/2006/main">
   <p:cSld>
     <p:spTree>
@@ -5258,7 +6251,7 @@
             <a:fld id="{3D16D23B-24D6-455E-BBD7-6975BEA16FD4}" type="slidenum">
               <a:rPr lang="ko-KR" altLang="en-US" smtClean="0"/>
               <a:pPr/>
-              <a:t>13</a:t>
+              <a:t>14</a:t>
             </a:fld>
             <a:r>
               <a:rPr lang="en-US" altLang="ko-KR" dirty="0"/>
@@ -5534,7 +6527,7 @@
 </p:sld>
 </file>
 
-<file path=ppt/slides/slide14.xml><?xml version="1.0" encoding="utf-8"?>
+<file path=ppt/slides/slide15.xml><?xml version="1.0" encoding="utf-8"?>
 <p:sld xmlns:a="http://schemas.openxmlformats.org/drawingml/2006/main" xmlns:r="http://schemas.openxmlformats.org/officeDocument/2006/relationships" xmlns:p="http://schemas.openxmlformats.org/presentationml/2006/main">
   <p:cSld>
     <p:spTree>
@@ -5591,7 +6584,7 @@
                 <a:ea typeface="+mn-ea"/>
               </a:rPr>
               <a:pPr/>
-              <a:t>14</a:t>
+              <a:t>15</a:t>
             </a:fld>
             <a:r>
               <a:rPr lang="en-US" altLang="ko-KR" dirty="0">
@@ -5681,7 +6674,7 @@
               <a:rPr lang="en-US" altLang="ko-KR" b="1" dirty="0">
                 <a:latin typeface="+mn-ea"/>
               </a:rPr>
-              <a:t>files and directories’ names</a:t>
+              <a:t>files and directory’s names</a:t>
             </a:r>
             <a:r>
               <a:rPr lang="en-US" altLang="ko-KR" dirty="0">
@@ -5744,7 +6737,7 @@
                 </a:solidFill>
                 <a:latin typeface="+mn-ea"/>
               </a:rPr>
-              <a:t>~9.29</a:t>
+              <a:t>~9.19</a:t>
             </a:r>
             <a:r>
               <a:rPr lang="ko-KR" altLang="en-US" b="1" dirty="0">
@@ -6055,7 +7048,7 @@
               <a:rPr lang="en-US" altLang="ko-KR" sz="2000" dirty="0">
                 <a:latin typeface="+mn-ea"/>
               </a:rPr>
-              <a:t> (object file)  |-readme (file)</a:t>
+              <a:t> (object file)</a:t>
             </a:r>
           </a:p>
           <a:p>
@@ -6092,7 +7085,7 @@
 </p:sld>
 </file>
 
-<file path=ppt/slides/slide15.xml><?xml version="1.0" encoding="utf-8"?>
+<file path=ppt/slides/slide16.xml><?xml version="1.0" encoding="utf-8"?>
 <p:sld xmlns:a="http://schemas.openxmlformats.org/drawingml/2006/main" xmlns:r="http://schemas.openxmlformats.org/officeDocument/2006/relationships" xmlns:p="http://schemas.openxmlformats.org/presentationml/2006/main">
   <p:cSld>
     <p:spTree>
@@ -6143,7 +7136,7 @@
             <a:fld id="{3D16D23B-24D6-455E-BBD7-6975BEA16FD4}" type="slidenum">
               <a:rPr lang="ko-KR" altLang="en-US" smtClean="0"/>
               <a:pPr/>
-              <a:t>15</a:t>
+              <a:t>16</a:t>
             </a:fld>
             <a:r>
               <a:rPr lang="en-US" altLang="ko-KR" dirty="0"/>
@@ -6370,7 +7363,7 @@
 </p:sld>
 </file>
 
-<file path=ppt/slides/slide16.xml><?xml version="1.0" encoding="utf-8"?>
+<file path=ppt/slides/slide17.xml><?xml version="1.0" encoding="utf-8"?>
 <p:sld xmlns:a="http://schemas.openxmlformats.org/drawingml/2006/main" xmlns:r="http://schemas.openxmlformats.org/officeDocument/2006/relationships" xmlns:p="http://schemas.openxmlformats.org/presentationml/2006/main">
   <p:cSld>
     <p:spTree>
@@ -6421,7 +7414,7 @@
             <a:fld id="{3D16D23B-24D6-455E-BBD7-6975BEA16FD4}" type="slidenum">
               <a:rPr lang="ko-KR" altLang="en-US" smtClean="0"/>
               <a:pPr/>
-              <a:t>16</a:t>
+              <a:t>17</a:t>
             </a:fld>
             <a:r>
               <a:rPr lang="en-US" altLang="ko-KR" dirty="0"/>
@@ -6923,8 +7916,8 @@
         </p:nvSpPr>
         <p:spPr>
           <a:xfrm>
-            <a:off x="4822077" y="4852735"/>
-            <a:ext cx="2481042" cy="369332"/>
+            <a:off x="4822076" y="4852735"/>
+            <a:ext cx="2645523" cy="369332"/>
           </a:xfrm>
           <a:prstGeom prst="rect">
             <a:avLst/>
@@ -6938,10 +7931,14 @@
           <a:lstStyle/>
           <a:p>
             <a:r>
-              <a:rPr lang="en-US" altLang="ko-KR" dirty="0"/>
+              <a:rPr lang="en-US" altLang="ko-KR" dirty="0">
+                <a:latin typeface="+mn-ea"/>
+              </a:rPr>
               <a:t>Decommented test0.c</a:t>
             </a:r>
-            <a:endParaRPr lang="ko-KR" altLang="en-US" dirty="0"/>
+            <a:endParaRPr lang="ko-KR" altLang="en-US" dirty="0">
+              <a:latin typeface="+mn-ea"/>
+            </a:endParaRPr>
           </a:p>
         </p:txBody>
       </p:sp>
@@ -6997,8 +7994,8 @@
         </p:nvCxnSpPr>
         <p:spPr>
           <a:xfrm>
-            <a:off x="6523799" y="2551430"/>
-            <a:ext cx="1693573" cy="0"/>
+            <a:off x="6579215" y="2551430"/>
+            <a:ext cx="1792055" cy="0"/>
           </a:xfrm>
           <a:prstGeom prst="line">
             <a:avLst/>
@@ -7237,13 +8234,15 @@
               </a:ext>
             </a:extLst>
           </p:cNvPr>
-          <p:cNvCxnSpPr/>
+          <p:cNvCxnSpPr>
+            <a:cxnSpLocks/>
+          </p:cNvCxnSpPr>
           <p:nvPr/>
         </p:nvCxnSpPr>
         <p:spPr>
-          <a:xfrm>
-            <a:off x="1906073" y="2552841"/>
-            <a:ext cx="2511380" cy="0"/>
+          <a:xfrm flipV="1">
+            <a:off x="1809332" y="2551431"/>
+            <a:ext cx="2807351" cy="4235"/>
           </a:xfrm>
           <a:prstGeom prst="line">
             <a:avLst/>
@@ -7321,8 +8320,8 @@
         </p:nvCxnSpPr>
         <p:spPr>
           <a:xfrm>
-            <a:off x="4350327" y="2551430"/>
-            <a:ext cx="2282293" cy="1411"/>
+            <a:off x="4561267" y="2550020"/>
+            <a:ext cx="2126769" cy="2821"/>
           </a:xfrm>
           <a:prstGeom prst="line">
             <a:avLst/>
@@ -7363,9 +8362,9 @@
           <p:nvPr/>
         </p:nvCxnSpPr>
         <p:spPr>
-          <a:xfrm>
-            <a:off x="8208136" y="2551430"/>
-            <a:ext cx="1760112" cy="0"/>
+          <a:xfrm flipV="1">
+            <a:off x="8371270" y="2551430"/>
+            <a:ext cx="1788730" cy="1"/>
           </a:xfrm>
           <a:prstGeom prst="line">
             <a:avLst/>
@@ -7444,13 +8443,12 @@
           </p:cNvPr>
           <p:cNvCxnSpPr>
             <a:cxnSpLocks/>
-            <a:endCxn id="26" idx="1"/>
           </p:cNvCxnSpPr>
           <p:nvPr/>
         </p:nvCxnSpPr>
         <p:spPr>
           <a:xfrm rot="16200000" flipH="1">
-            <a:off x="4362804" y="2794821"/>
+            <a:off x="4463691" y="2768186"/>
             <a:ext cx="560060" cy="163134"/>
           </a:xfrm>
           <a:prstGeom prst="bentConnector2">
@@ -7493,7 +8491,7 @@
         <p:spPr>
           <a:xfrm>
             <a:off x="4724401" y="2971752"/>
-            <a:ext cx="1371599" cy="369332"/>
+            <a:ext cx="1963635" cy="369332"/>
           </a:xfrm>
           <a:prstGeom prst="rect">
             <a:avLst/>
@@ -7510,7 +8508,7 @@
               <a:rPr lang="en-US" altLang="ko-KR" dirty="0">
                 <a:latin typeface="+mn-ea"/>
               </a:rPr>
-              <a:t>Target file</a:t>
+              <a:t>Target(input) file</a:t>
             </a:r>
             <a:endParaRPr lang="ko-KR" altLang="en-US" dirty="0">
               <a:latin typeface="+mn-ea"/>
@@ -7529,13 +8527,12 @@
           </p:cNvPr>
           <p:cNvCxnSpPr>
             <a:cxnSpLocks/>
-            <a:endCxn id="33" idx="1"/>
           </p:cNvCxnSpPr>
           <p:nvPr/>
         </p:nvCxnSpPr>
         <p:spPr>
           <a:xfrm rot="16200000" flipH="1">
-            <a:off x="6434155" y="2815808"/>
+            <a:off x="6571139" y="2773197"/>
             <a:ext cx="560062" cy="163134"/>
           </a:xfrm>
           <a:prstGeom prst="bentConnector2">
@@ -7577,7 +8574,7 @@
         </p:nvSpPr>
         <p:spPr>
           <a:xfrm>
-            <a:off x="6795753" y="2992740"/>
+            <a:off x="6917548" y="2967336"/>
             <a:ext cx="1249249" cy="369332"/>
           </a:xfrm>
           <a:prstGeom prst="rect">
@@ -7614,13 +8611,12 @@
           </p:cNvPr>
           <p:cNvCxnSpPr>
             <a:cxnSpLocks/>
-            <a:endCxn id="37" idx="1"/>
           </p:cNvCxnSpPr>
           <p:nvPr/>
         </p:nvCxnSpPr>
         <p:spPr>
           <a:xfrm rot="16200000" flipH="1">
-            <a:off x="8009672" y="2793112"/>
+            <a:off x="8276742" y="2748484"/>
             <a:ext cx="560062" cy="163134"/>
           </a:xfrm>
           <a:prstGeom prst="bentConnector2">
@@ -7662,7 +8658,7 @@
         </p:nvSpPr>
         <p:spPr>
           <a:xfrm>
-            <a:off x="8371270" y="2970044"/>
+            <a:off x="8641010" y="2925416"/>
             <a:ext cx="1249249" cy="369332"/>
           </a:xfrm>
           <a:prstGeom prst="rect">
@@ -7804,7 +8800,7 @@
               <a:rPr lang="en-US" altLang="ko-KR" dirty="0">
                 <a:latin typeface="+mj-ea"/>
               </a:rPr>
-              <a:t>Requirements – Replace Each Comment with a Space (1/8)</a:t>
+              <a:t>Requirements – Replace Each Comment with a Space (1/9)</a:t>
             </a:r>
             <a:endParaRPr lang="ko-KR" altLang="en-US" dirty="0">
               <a:latin typeface="+mj-ea"/>
@@ -8339,7 +9335,7 @@
               <a:rPr lang="en-US" altLang="ko-KR" dirty="0">
                 <a:latin typeface="+mj-ea"/>
               </a:rPr>
-              <a:t>Requirements – Support Both Types of Comments (2/8)</a:t>
+              <a:t>Requirements – Support Both Types of Comments (2/9)</a:t>
             </a:r>
             <a:endParaRPr lang="ko-KR" altLang="en-US" dirty="0">
               <a:latin typeface="+mj-ea"/>
@@ -8365,8 +9361,8 @@
         </p:nvSpPr>
         <p:spPr>
           <a:xfrm>
-            <a:off x="602331" y="4082542"/>
-            <a:ext cx="11132468" cy="1700696"/>
+            <a:off x="602331" y="4294908"/>
+            <a:ext cx="11132468" cy="1488329"/>
           </a:xfrm>
         </p:spPr>
         <p:txBody>
@@ -9073,6 +10069,513 @@
         <p:cNvPr id="1" name="">
           <a:extLst>
             <a:ext uri="{FF2B5EF4-FFF2-40B4-BE49-F238E27FC236}">
+              <a16:creationId xmlns:a16="http://schemas.microsoft.com/office/drawing/2014/main" id="{381025BB-A946-EED7-BFC4-3F55641E8FF9}"/>
+            </a:ext>
+          </a:extLst>
+        </p:cNvPr>
+        <p:cNvGrpSpPr/>
+        <p:nvPr/>
+      </p:nvGrpSpPr>
+      <p:grpSpPr>
+        <a:xfrm>
+          <a:off x="0" y="0"/>
+          <a:ext cx="0" cy="0"/>
+          <a:chOff x="0" y="0"/>
+          <a:chExt cx="0" cy="0"/>
+        </a:xfrm>
+      </p:grpSpPr>
+      <p:sp>
+        <p:nvSpPr>
+          <p:cNvPr id="2" name="슬라이드 번호 개체 틀 1">
+            <a:extLst>
+              <a:ext uri="{FF2B5EF4-FFF2-40B4-BE49-F238E27FC236}">
+                <a16:creationId xmlns:a16="http://schemas.microsoft.com/office/drawing/2014/main" id="{7F0FFF29-1AB6-31CB-F53E-7C0366457BD5}"/>
+              </a:ext>
+            </a:extLst>
+          </p:cNvPr>
+          <p:cNvSpPr>
+            <a:spLocks noGrp="1"/>
+          </p:cNvSpPr>
+          <p:nvPr>
+            <p:ph type="sldNum" sz="quarter" idx="12"/>
+          </p:nvPr>
+        </p:nvSpPr>
+        <p:spPr/>
+        <p:txBody>
+          <a:bodyPr/>
+          <a:lstStyle/>
+          <a:p>
+            <a:r>
+              <a:rPr lang="en-US" altLang="ko-KR" dirty="0"/>
+              <a:t>-</a:t>
+            </a:r>
+            <a:fld id="{3D16D23B-24D6-455E-BBD7-6975BEA16FD4}" type="slidenum">
+              <a:rPr lang="ko-KR" altLang="en-US" smtClean="0"/>
+              <a:pPr/>
+              <a:t>6</a:t>
+            </a:fld>
+            <a:r>
+              <a:rPr lang="en-US" altLang="ko-KR" dirty="0"/>
+              <a:t>-</a:t>
+            </a:r>
+            <a:endParaRPr lang="ko-KR" altLang="en-US" dirty="0"/>
+          </a:p>
+        </p:txBody>
+      </p:sp>
+      <p:sp>
+        <p:nvSpPr>
+          <p:cNvPr id="3" name="제목 2">
+            <a:extLst>
+              <a:ext uri="{FF2B5EF4-FFF2-40B4-BE49-F238E27FC236}">
+                <a16:creationId xmlns:a16="http://schemas.microsoft.com/office/drawing/2014/main" id="{9B357471-B07D-6A67-6F63-9D8DADF4BB0B}"/>
+              </a:ext>
+            </a:extLst>
+          </p:cNvPr>
+          <p:cNvSpPr>
+            <a:spLocks noGrp="1"/>
+          </p:cNvSpPr>
+          <p:nvPr>
+            <p:ph type="title"/>
+          </p:nvPr>
+        </p:nvSpPr>
+        <p:spPr>
+          <a:xfrm>
+            <a:off x="391886" y="173474"/>
+            <a:ext cx="11553891" cy="573577"/>
+          </a:xfrm>
+        </p:spPr>
+        <p:txBody>
+          <a:bodyPr/>
+          <a:lstStyle/>
+          <a:p>
+            <a:r>
+              <a:rPr lang="en-US" altLang="ko-KR" dirty="0">
+                <a:latin typeface="+mj-ea"/>
+              </a:rPr>
+              <a:t>Requirements – Comments within Comments(3/9)</a:t>
+            </a:r>
+            <a:endParaRPr lang="ko-KR" altLang="en-US" dirty="0">
+              <a:latin typeface="+mj-ea"/>
+            </a:endParaRPr>
+          </a:p>
+        </p:txBody>
+      </p:sp>
+      <p:sp>
+        <p:nvSpPr>
+          <p:cNvPr id="4" name="텍스트 개체 틀 3">
+            <a:extLst>
+              <a:ext uri="{FF2B5EF4-FFF2-40B4-BE49-F238E27FC236}">
+                <a16:creationId xmlns:a16="http://schemas.microsoft.com/office/drawing/2014/main" id="{8248735A-7EEB-1F6D-D703-B5B71E94EE85}"/>
+              </a:ext>
+            </a:extLst>
+          </p:cNvPr>
+          <p:cNvSpPr>
+            <a:spLocks noGrp="1"/>
+          </p:cNvSpPr>
+          <p:nvPr>
+            <p:ph type="body" sz="quarter" idx="13"/>
+          </p:nvPr>
+        </p:nvSpPr>
+        <p:spPr>
+          <a:xfrm>
+            <a:off x="602597" y="4120062"/>
+            <a:ext cx="11132468" cy="1211327"/>
+          </a:xfrm>
+        </p:spPr>
+        <p:txBody>
+          <a:bodyPr/>
+          <a:lstStyle/>
+          <a:p>
+            <a:r>
+              <a:rPr lang="en-US" altLang="ko-KR" sz="2000" dirty="0">
+                <a:solidFill>
+                  <a:schemeClr val="tx1"/>
+                </a:solidFill>
+                <a:latin typeface="+mn-ea"/>
+              </a:rPr>
+              <a:t>A multi-line comment begins when the preprocess encounters "/*" for the first time</a:t>
+            </a:r>
+            <a:endParaRPr lang="en-US" altLang="ko-KR" sz="1800" dirty="0">
+              <a:solidFill>
+                <a:schemeClr val="tx1"/>
+              </a:solidFill>
+              <a:latin typeface="+mn-ea"/>
+            </a:endParaRPr>
+          </a:p>
+          <a:p>
+            <a:r>
+              <a:rPr lang="en-US" altLang="ko-KR" sz="2000" dirty="0">
+                <a:solidFill>
+                  <a:schemeClr val="tx1"/>
+                </a:solidFill>
+                <a:latin typeface="+mn-ea"/>
+              </a:rPr>
+              <a:t>The comment ends when it encounters "*/" after the comment begins</a:t>
+            </a:r>
+            <a:endParaRPr lang="en-US" altLang="ko-KR" sz="2000" b="1" dirty="0">
+              <a:solidFill>
+                <a:schemeClr val="tx1"/>
+              </a:solidFill>
+              <a:latin typeface="+mn-ea"/>
+            </a:endParaRPr>
+          </a:p>
+        </p:txBody>
+      </p:sp>
+      <p:graphicFrame>
+        <p:nvGraphicFramePr>
+          <p:cNvPr id="13" name="표 12">
+            <a:extLst>
+              <a:ext uri="{FF2B5EF4-FFF2-40B4-BE49-F238E27FC236}">
+                <a16:creationId xmlns:a16="http://schemas.microsoft.com/office/drawing/2014/main" id="{54F31C79-2CC2-5C70-3579-B40BDF8EB2E0}"/>
+              </a:ext>
+            </a:extLst>
+          </p:cNvPr>
+          <p:cNvGraphicFramePr>
+            <a:graphicFrameLocks noGrp="1"/>
+          </p:cNvGraphicFramePr>
+          <p:nvPr>
+            <p:extLst>
+              <p:ext uri="{D42A27DB-BD31-4B8C-83A1-F6EECF244321}">
+                <p14:modId xmlns:p14="http://schemas.microsoft.com/office/powerpoint/2010/main" val="4180924984"/>
+              </p:ext>
+            </p:extLst>
+          </p:nvPr>
+        </p:nvGraphicFramePr>
+        <p:xfrm>
+          <a:off x="960638" y="1518063"/>
+          <a:ext cx="10416385" cy="1830987"/>
+        </p:xfrm>
+        <a:graphic>
+          <a:graphicData uri="http://schemas.openxmlformats.org/drawingml/2006/table">
+            <a:tbl>
+              <a:tblPr firstRow="1" bandRow="1">
+                <a:tableStyleId>{5C22544A-7EE6-4342-B048-85BDC9FD1C3A}</a:tableStyleId>
+              </a:tblPr>
+              <a:tblGrid>
+                <a:gridCol w="4506036">
+                  <a:extLst>
+                    <a:ext uri="{9D8B030D-6E8A-4147-A177-3AD203B41FA5}">
+                      <a16:colId xmlns:a16="http://schemas.microsoft.com/office/drawing/2014/main" val="2891475324"/>
+                    </a:ext>
+                  </a:extLst>
+                </a:gridCol>
+                <a:gridCol w="2909455">
+                  <a:extLst>
+                    <a:ext uri="{9D8B030D-6E8A-4147-A177-3AD203B41FA5}">
+                      <a16:colId xmlns:a16="http://schemas.microsoft.com/office/drawing/2014/main" val="163360775"/>
+                    </a:ext>
+                  </a:extLst>
+                </a:gridCol>
+                <a:gridCol w="3000894">
+                  <a:extLst>
+                    <a:ext uri="{9D8B030D-6E8A-4147-A177-3AD203B41FA5}">
+                      <a16:colId xmlns:a16="http://schemas.microsoft.com/office/drawing/2014/main" val="3459507647"/>
+                    </a:ext>
+                  </a:extLst>
+                </a:gridCol>
+              </a:tblGrid>
+              <a:tr h="671669">
+                <a:tc>
+                  <a:txBody>
+                    <a:bodyPr/>
+                    <a:lstStyle/>
+                    <a:p>
+                      <a:pPr marL="0" marR="0" lvl="0" indent="0" algn="ctr" defTabSz="914377" rtl="0" eaLnBrk="1" fontAlgn="auto" latinLnBrk="1" hangingPunct="1">
+                        <a:lnSpc>
+                          <a:spcPct val="100000"/>
+                        </a:lnSpc>
+                        <a:spcBef>
+                          <a:spcPts val="0"/>
+                        </a:spcBef>
+                        <a:spcAft>
+                          <a:spcPts val="0"/>
+                        </a:spcAft>
+                        <a:buClrTx/>
+                        <a:buSzTx/>
+                        <a:buFontTx/>
+                        <a:buNone/>
+                        <a:tabLst/>
+                        <a:defRPr/>
+                      </a:pPr>
+                      <a:r>
+                        <a:rPr lang="en-US" altLang="ko-KR" b="0">
+                          <a:latin typeface="+mn-ea"/>
+                          <a:ea typeface="+mn-ea"/>
+                        </a:rPr>
+                        <a:t>Standard Input Stream</a:t>
+                      </a:r>
+                      <a:endParaRPr lang="ko-KR" altLang="en-US" b="0" dirty="0">
+                        <a:latin typeface="+mn-ea"/>
+                        <a:ea typeface="+mn-ea"/>
+                      </a:endParaRPr>
+                    </a:p>
+                  </a:txBody>
+                  <a:tcPr anchor="ctr"/>
+                </a:tc>
+                <a:tc>
+                  <a:txBody>
+                    <a:bodyPr/>
+                    <a:lstStyle/>
+                    <a:p>
+                      <a:pPr marL="0" marR="0" lvl="0" indent="0" algn="ctr" defTabSz="914377" rtl="0" eaLnBrk="1" fontAlgn="auto" latinLnBrk="1" hangingPunct="1">
+                        <a:lnSpc>
+                          <a:spcPct val="100000"/>
+                        </a:lnSpc>
+                        <a:spcBef>
+                          <a:spcPts val="0"/>
+                        </a:spcBef>
+                        <a:spcAft>
+                          <a:spcPts val="0"/>
+                        </a:spcAft>
+                        <a:buClrTx/>
+                        <a:buSzTx/>
+                        <a:buFontTx/>
+                        <a:buNone/>
+                        <a:tabLst/>
+                        <a:defRPr/>
+                      </a:pPr>
+                      <a:r>
+                        <a:rPr lang="en-US" altLang="ko-KR" b="0" dirty="0">
+                          <a:latin typeface="+mn-ea"/>
+                          <a:ea typeface="+mn-ea"/>
+                        </a:rPr>
+                        <a:t>Standard Output Stream</a:t>
+                      </a:r>
+                      <a:endParaRPr lang="ko-KR" altLang="en-US" b="0" dirty="0">
+                        <a:latin typeface="+mn-ea"/>
+                        <a:ea typeface="+mn-ea"/>
+                      </a:endParaRPr>
+                    </a:p>
+                  </a:txBody>
+                  <a:tcPr anchor="ctr"/>
+                </a:tc>
+                <a:tc>
+                  <a:txBody>
+                    <a:bodyPr/>
+                    <a:lstStyle/>
+                    <a:p>
+                      <a:pPr marL="0" marR="0" lvl="0" indent="0" algn="ctr" defTabSz="914377" rtl="0" eaLnBrk="1" fontAlgn="auto" latinLnBrk="1" hangingPunct="1">
+                        <a:lnSpc>
+                          <a:spcPct val="100000"/>
+                        </a:lnSpc>
+                        <a:spcBef>
+                          <a:spcPts val="0"/>
+                        </a:spcBef>
+                        <a:spcAft>
+                          <a:spcPts val="0"/>
+                        </a:spcAft>
+                        <a:buClrTx/>
+                        <a:buSzTx/>
+                        <a:buFontTx/>
+                        <a:buNone/>
+                        <a:tabLst/>
+                        <a:defRPr/>
+                      </a:pPr>
+                      <a:r>
+                        <a:rPr lang="en-US" altLang="ko-KR" b="0">
+                          <a:latin typeface="+mn-ea"/>
+                          <a:ea typeface="+mn-ea"/>
+                        </a:rPr>
+                        <a:t>Standard Error Stream</a:t>
+                      </a:r>
+                      <a:endParaRPr lang="ko-KR" altLang="en-US" b="0" dirty="0">
+                        <a:latin typeface="+mn-ea"/>
+                        <a:ea typeface="+mn-ea"/>
+                      </a:endParaRPr>
+                    </a:p>
+                  </a:txBody>
+                  <a:tcPr anchor="ctr"/>
+                </a:tc>
+                <a:extLst>
+                  <a:ext uri="{0D108BD9-81ED-4DB2-BD59-A6C34878D82A}">
+                    <a16:rowId xmlns:a16="http://schemas.microsoft.com/office/drawing/2014/main" val="1272094073"/>
+                  </a:ext>
+                </a:extLst>
+              </a:tr>
+              <a:tr h="1159318">
+                <a:tc>
+                  <a:txBody>
+                    <a:bodyPr/>
+                    <a:lstStyle/>
+                    <a:p>
+                      <a:pPr algn="ctr"/>
+                      <a:r>
+                        <a:rPr lang="en-US" altLang="ko-KR" sz="2800" dirty="0" err="1">
+                          <a:latin typeface="+mn-ea"/>
+                          <a:ea typeface="+mn-ea"/>
+                        </a:rPr>
+                        <a:t>abc</a:t>
+                      </a:r>
+                      <a:r>
+                        <a:rPr lang="en-US" altLang="ko-KR" sz="2800" dirty="0">
+                          <a:solidFill>
+                            <a:srgbClr val="FF0000"/>
+                          </a:solidFill>
+                          <a:latin typeface="+mn-ea"/>
+                          <a:ea typeface="+mn-ea"/>
+                        </a:rPr>
+                        <a:t>/*def/*</a:t>
+                      </a:r>
+                      <a:r>
+                        <a:rPr lang="en-US" altLang="ko-KR" sz="2800" dirty="0" err="1">
+                          <a:solidFill>
+                            <a:srgbClr val="FF0000"/>
+                          </a:solidFill>
+                          <a:latin typeface="+mn-ea"/>
+                          <a:ea typeface="+mn-ea"/>
+                        </a:rPr>
+                        <a:t>ghi</a:t>
+                      </a:r>
+                      <a:r>
+                        <a:rPr lang="en-US" altLang="ko-KR" sz="2800" dirty="0">
+                          <a:solidFill>
+                            <a:srgbClr val="FF0000"/>
+                          </a:solidFill>
+                          <a:latin typeface="+mn-ea"/>
+                          <a:ea typeface="+mn-ea"/>
+                        </a:rPr>
+                        <a:t>*/</a:t>
+                      </a:r>
+                      <a:r>
+                        <a:rPr lang="en-US" altLang="ko-KR" sz="2800" dirty="0" err="1">
+                          <a:latin typeface="+mn-ea"/>
+                          <a:ea typeface="+mn-ea"/>
+                        </a:rPr>
+                        <a:t>jkl</a:t>
+                      </a:r>
+                      <a:r>
+                        <a:rPr lang="en-US" altLang="ko-KR" sz="2800" dirty="0">
+                          <a:latin typeface="+mn-ea"/>
+                          <a:ea typeface="+mn-ea"/>
+                        </a:rPr>
+                        <a:t>*/</a:t>
+                      </a:r>
+                      <a:r>
+                        <a:rPr lang="en-US" altLang="ko-KR" sz="2800" dirty="0" err="1">
+                          <a:latin typeface="+mn-ea"/>
+                          <a:ea typeface="+mn-ea"/>
+                        </a:rPr>
+                        <a:t>mno</a:t>
+                      </a:r>
+                      <a:r>
+                        <a:rPr lang="en-US" altLang="ko-KR" sz="2800" baseline="-25000" dirty="0" err="1">
+                          <a:latin typeface="+mn-ea"/>
+                          <a:ea typeface="+mn-ea"/>
+                        </a:rPr>
+                        <a:t>n</a:t>
+                      </a:r>
+                      <a:endParaRPr lang="ko-KR" altLang="en-US" sz="2800" dirty="0">
+                        <a:latin typeface="+mn-ea"/>
+                        <a:ea typeface="+mn-ea"/>
+                      </a:endParaRPr>
+                    </a:p>
+                  </a:txBody>
+                  <a:tcPr anchor="ctr"/>
+                </a:tc>
+                <a:tc>
+                  <a:txBody>
+                    <a:bodyPr/>
+                    <a:lstStyle/>
+                    <a:p>
+                      <a:pPr algn="ctr"/>
+                      <a:r>
+                        <a:rPr lang="en-US" altLang="ko-KR" sz="2800" dirty="0" err="1">
+                          <a:latin typeface="+mn-ea"/>
+                          <a:ea typeface="+mn-ea"/>
+                        </a:rPr>
+                        <a:t>abc</a:t>
+                      </a:r>
+                      <a:r>
+                        <a:rPr lang="en-US" altLang="ko-KR" sz="2800" baseline="-25000" dirty="0" err="1">
+                          <a:solidFill>
+                            <a:srgbClr val="FF0000"/>
+                          </a:solidFill>
+                          <a:latin typeface="+mn-ea"/>
+                          <a:ea typeface="+mn-ea"/>
+                        </a:rPr>
+                        <a:t>s</a:t>
+                      </a:r>
+                      <a:r>
+                        <a:rPr lang="en-US" altLang="ko-KR" sz="2800" baseline="0" dirty="0" err="1">
+                          <a:latin typeface="+mn-ea"/>
+                          <a:ea typeface="+mn-ea"/>
+                        </a:rPr>
+                        <a:t>jkl</a:t>
+                      </a:r>
+                      <a:r>
+                        <a:rPr lang="en-US" altLang="ko-KR" sz="2800" baseline="0" dirty="0">
+                          <a:latin typeface="+mn-ea"/>
+                          <a:ea typeface="+mn-ea"/>
+                        </a:rPr>
+                        <a:t>*/</a:t>
+                      </a:r>
+                      <a:r>
+                        <a:rPr lang="en-US" altLang="ko-KR" sz="2800" baseline="0" dirty="0" err="1">
+                          <a:latin typeface="+mn-ea"/>
+                          <a:ea typeface="+mn-ea"/>
+                        </a:rPr>
+                        <a:t>mno</a:t>
+                      </a:r>
+                      <a:r>
+                        <a:rPr lang="en-US" altLang="ko-KR" sz="2800" baseline="-25000" dirty="0" err="1">
+                          <a:latin typeface="+mn-ea"/>
+                          <a:ea typeface="+mn-ea"/>
+                        </a:rPr>
+                        <a:t>n</a:t>
+                      </a:r>
+                      <a:endParaRPr lang="ko-KR" altLang="en-US" sz="2800" dirty="0">
+                        <a:latin typeface="+mn-ea"/>
+                        <a:ea typeface="+mn-ea"/>
+                      </a:endParaRPr>
+                    </a:p>
+                  </a:txBody>
+                  <a:tcPr anchor="ctr"/>
+                </a:tc>
+                <a:tc>
+                  <a:txBody>
+                    <a:bodyPr/>
+                    <a:lstStyle/>
+                    <a:p>
+                      <a:pPr algn="ctr" latinLnBrk="1"/>
+                      <a:endParaRPr lang="ko-KR" altLang="en-US" sz="3600" dirty="0">
+                        <a:latin typeface="+mn-ea"/>
+                        <a:ea typeface="+mn-ea"/>
+                      </a:endParaRPr>
+                    </a:p>
+                  </a:txBody>
+                  <a:tcPr anchor="ctr"/>
+                </a:tc>
+                <a:extLst>
+                  <a:ext uri="{0D108BD9-81ED-4DB2-BD59-A6C34878D82A}">
+                    <a16:rowId xmlns:a16="http://schemas.microsoft.com/office/drawing/2014/main" val="966249997"/>
+                  </a:ext>
+                </a:extLst>
+              </a:tr>
+            </a:tbl>
+          </a:graphicData>
+        </a:graphic>
+      </p:graphicFrame>
+    </p:spTree>
+    <p:extLst>
+      <p:ext uri="{BB962C8B-B14F-4D97-AF65-F5344CB8AC3E}">
+        <p14:creationId xmlns:p14="http://schemas.microsoft.com/office/powerpoint/2010/main" val="3997139429"/>
+      </p:ext>
+    </p:extLst>
+  </p:cSld>
+  <p:clrMapOvr>
+    <a:masterClrMapping/>
+  </p:clrMapOvr>
+</p:sld>
+</file>
+
+<file path=ppt/slides/slide7.xml><?xml version="1.0" encoding="utf-8"?>
+<p:sld xmlns:a="http://schemas.openxmlformats.org/drawingml/2006/main" xmlns:r="http://schemas.openxmlformats.org/officeDocument/2006/relationships" xmlns:p="http://schemas.openxmlformats.org/presentationml/2006/main">
+  <p:cSld>
+    <p:spTree>
+      <p:nvGrpSpPr>
+        <p:cNvPr id="1" name="">
+          <a:extLst>
+            <a:ext uri="{FF2B5EF4-FFF2-40B4-BE49-F238E27FC236}">
               <a16:creationId xmlns:a16="http://schemas.microsoft.com/office/drawing/2014/main" id="{C4F468D8-7D60-F854-6252-95D6D0C36502}"/>
             </a:ext>
           </a:extLst>
@@ -9116,7 +10619,7 @@
             <a:fld id="{3D16D23B-24D6-455E-BBD7-6975BEA16FD4}" type="slidenum">
               <a:rPr lang="ko-KR" altLang="en-US" smtClean="0"/>
               <a:pPr/>
-              <a:t>6</a:t>
+              <a:t>7</a:t>
             </a:fld>
             <a:r>
               <a:rPr lang="en-US" altLang="ko-KR" dirty="0"/>
@@ -9156,7 +10659,7 @@
               <a:rPr lang="en-US" altLang="ko-KR" dirty="0">
                 <a:latin typeface="+mj-ea"/>
               </a:rPr>
-              <a:t>Requirements – Exceptions: Comment in Str or Char Const (3/8)</a:t>
+              <a:t>Requirements – Exceptions: Comment in Str or Char Const (4/9)</a:t>
             </a:r>
             <a:endParaRPr lang="ko-KR" altLang="en-US" dirty="0">
               <a:latin typeface="+mj-ea"/>
@@ -9795,7 +11298,7 @@
 </p:sld>
 </file>
 
-<file path=ppt/slides/slide7.xml><?xml version="1.0" encoding="utf-8"?>
+<file path=ppt/slides/slide8.xml><?xml version="1.0" encoding="utf-8"?>
 <p:sld xmlns:a="http://schemas.openxmlformats.org/drawingml/2006/main" xmlns:r="http://schemas.openxmlformats.org/officeDocument/2006/relationships" xmlns:p="http://schemas.openxmlformats.org/presentationml/2006/main">
   <p:cSld>
     <p:spTree>
@@ -9846,7 +11349,7 @@
             <a:fld id="{3D16D23B-24D6-455E-BBD7-6975BEA16FD4}" type="slidenum">
               <a:rPr lang="ko-KR" altLang="en-US" smtClean="0"/>
               <a:pPr/>
-              <a:t>7</a:t>
+              <a:t>8</a:t>
             </a:fld>
             <a:r>
               <a:rPr lang="en-US" altLang="ko-KR" dirty="0"/>
@@ -9875,7 +11378,7 @@
         <p:spPr>
           <a:xfrm>
             <a:off x="391886" y="173474"/>
-            <a:ext cx="11553891" cy="573577"/>
+            <a:ext cx="11800114" cy="573577"/>
           </a:xfrm>
         </p:spPr>
         <p:txBody>
@@ -9886,7 +11389,20 @@
               <a:rPr lang="en-US" altLang="ko-KR" dirty="0">
                 <a:latin typeface="+mj-ea"/>
               </a:rPr>
-              <a:t>Requirements – Handle ‘\’ as the ordinary characters (4/8)</a:t>
+              <a:t>Requirements – Handle ‘</a:t>
+            </a:r>
+            <a:r>
+              <a:rPr lang="en-US" altLang="ko-KR" b="0" i="0" dirty="0">
+                <a:effectLst/>
+                <a:latin typeface="Arial" panose="020B0604020202020204" pitchFamily="34" charset="0"/>
+              </a:rPr>
+              <a:t>\</a:t>
+            </a:r>
+            <a:r>
+              <a:rPr lang="en-US" altLang="ko-KR" dirty="0">
+                <a:latin typeface="+mj-ea"/>
+              </a:rPr>
+              <a:t>’ as the ordinary characters (5/9)</a:t>
             </a:r>
             <a:endParaRPr lang="ko-KR" altLang="en-US" dirty="0">
               <a:latin typeface="+mj-ea"/>
@@ -9924,7 +11440,20 @@
               <a:rPr lang="en-US" altLang="ko-KR" dirty="0">
                 <a:latin typeface="+mn-ea"/>
               </a:rPr>
-              <a:t>Handle ‘\’ as the ordinary characters when</a:t>
+              <a:t>Handle ‘</a:t>
+            </a:r>
+            <a:r>
+              <a:rPr lang="en-US" altLang="ko-KR" b="0" i="0" dirty="0">
+                <a:effectLst/>
+                <a:latin typeface="Arial" panose="020B0604020202020204" pitchFamily="34" charset="0"/>
+              </a:rPr>
+              <a:t>\</a:t>
+            </a:r>
+            <a:r>
+              <a:rPr lang="en-US" altLang="ko-KR" dirty="0">
+                <a:latin typeface="+mn-ea"/>
+              </a:rPr>
+              <a:t>’ as the ordinary characters when</a:t>
             </a:r>
           </a:p>
           <a:p>
@@ -9997,7 +11526,7 @@
           <p:nvPr>
             <p:extLst>
               <p:ext uri="{D42A27DB-BD31-4B8C-83A1-F6EECF244321}">
-                <p14:modId xmlns:p14="http://schemas.microsoft.com/office/powerpoint/2010/main" val="506285216"/>
+                <p14:modId xmlns:p14="http://schemas.microsoft.com/office/powerpoint/2010/main" val="1599707371"/>
               </p:ext>
             </p:extLst>
           </p:nvPr>
@@ -10249,9 +11778,9 @@
                         <a:t>abc"def</a:t>
                       </a:r>
                       <a:r>
-                        <a:rPr lang="en-US" altLang="ko-KR" sz="2800" dirty="0">
-                          <a:latin typeface="+mn-ea"/>
-                          <a:ea typeface="+mn-ea"/>
+                        <a:rPr lang="en-US" altLang="ko-KR" sz="2800" b="0" i="0" dirty="0">
+                          <a:effectLst/>
+                          <a:latin typeface="Arial" panose="020B0604020202020204" pitchFamily="34" charset="0"/>
                         </a:rPr>
                         <a:t>\</a:t>
                       </a:r>
@@ -10291,9 +11820,9 @@
                         <a:t>abc"def</a:t>
                       </a:r>
                       <a:r>
-                        <a:rPr lang="en-US" altLang="ko-KR" sz="2800" dirty="0">
-                          <a:latin typeface="+mn-ea"/>
-                          <a:ea typeface="+mn-ea"/>
+                        <a:rPr lang="en-US" altLang="ko-KR" sz="2800" b="0" i="0" dirty="0">
+                          <a:effectLst/>
+                          <a:latin typeface="Arial" panose="020B0604020202020204" pitchFamily="34" charset="0"/>
                         </a:rPr>
                         <a:t>\</a:t>
                       </a:r>
@@ -10391,9 +11920,9 @@
                         <a:t>abc'def</a:t>
                       </a:r>
                       <a:r>
-                        <a:rPr lang="en-US" altLang="ko-KR" sz="2800" dirty="0">
-                          <a:latin typeface="+mn-ea"/>
-                          <a:ea typeface="+mn-ea"/>
+                        <a:rPr lang="en-US" altLang="ko-KR" sz="2800" b="0" i="0" dirty="0">
+                          <a:effectLst/>
+                          <a:latin typeface="Arial" panose="020B0604020202020204" pitchFamily="34" charset="0"/>
                         </a:rPr>
                         <a:t>\</a:t>
                       </a:r>
@@ -10433,9 +11962,9 @@
                         <a:t>abc'def</a:t>
                       </a:r>
                       <a:r>
-                        <a:rPr lang="en-US" altLang="ko-KR" sz="2800" dirty="0">
-                          <a:latin typeface="+mn-ea"/>
-                          <a:ea typeface="+mn-ea"/>
+                        <a:rPr lang="en-US" altLang="ko-KR" sz="2800" b="0" i="0" dirty="0">
+                          <a:effectLst/>
+                          <a:latin typeface="Arial" panose="020B0604020202020204" pitchFamily="34" charset="0"/>
                         </a:rPr>
                         <a:t>\</a:t>
                       </a:r>
@@ -10498,7 +12027,7 @@
 </p:sld>
 </file>
 
-<file path=ppt/slides/slide8.xml><?xml version="1.0" encoding="utf-8"?>
+<file path=ppt/slides/slide9.xml><?xml version="1.0" encoding="utf-8"?>
 <p:sld xmlns:a="http://schemas.openxmlformats.org/drawingml/2006/main" xmlns:r="http://schemas.openxmlformats.org/officeDocument/2006/relationships" xmlns:p="http://schemas.openxmlformats.org/presentationml/2006/main">
   <p:cSld>
     <p:spTree>
@@ -10549,7 +12078,7 @@
             <a:fld id="{3D16D23B-24D6-455E-BBD7-6975BEA16FD4}" type="slidenum">
               <a:rPr lang="ko-KR" altLang="en-US" smtClean="0"/>
               <a:pPr/>
-              <a:t>8</a:t>
+              <a:t>9</a:t>
             </a:fld>
             <a:r>
               <a:rPr lang="en-US" altLang="ko-KR" dirty="0"/>
@@ -10589,7 +12118,7 @@
               <a:rPr lang="en-US" altLang="ko-KR" dirty="0">
                 <a:latin typeface="+mj-ea"/>
               </a:rPr>
-              <a:t>Requirements – Newline Characters in Str or Char Const (5/8)</a:t>
+              <a:t>Requirements – Newline Characters in Str or Char Const (6/9)</a:t>
             </a:r>
             <a:endParaRPr lang="ko-KR" altLang="en-US" dirty="0">
               <a:latin typeface="+mj-ea"/>
@@ -10627,7 +12156,20 @@
               <a:rPr lang="en-US" altLang="ko-KR" dirty="0">
                 <a:latin typeface="+mn-ea"/>
               </a:rPr>
-              <a:t>Handle ‘\n’ in str or chat const without generating errors or warnings</a:t>
+              <a:t>Handle ‘</a:t>
+            </a:r>
+            <a:r>
+              <a:rPr lang="en-US" altLang="ko-KR" b="0" i="0" dirty="0">
+                <a:effectLst/>
+                <a:latin typeface="Arial" panose="020B0604020202020204" pitchFamily="34" charset="0"/>
+              </a:rPr>
+              <a:t>\</a:t>
+            </a:r>
+            <a:r>
+              <a:rPr lang="en-US" altLang="ko-KR" dirty="0">
+                <a:latin typeface="+mn-ea"/>
+              </a:rPr>
+              <a:t>n’ in str or chat const without generating errors or warnings</a:t>
             </a:r>
           </a:p>
           <a:p>
@@ -11180,753 +12722,6 @@
     <p:extLst>
       <p:ext uri="{BB962C8B-B14F-4D97-AF65-F5344CB8AC3E}">
         <p14:creationId xmlns:p14="http://schemas.microsoft.com/office/powerpoint/2010/main" val="2062495633"/>
-      </p:ext>
-    </p:extLst>
-  </p:cSld>
-  <p:clrMapOvr>
-    <a:masterClrMapping/>
-  </p:clrMapOvr>
-</p:sld>
-</file>
-
-<file path=ppt/slides/slide9.xml><?xml version="1.0" encoding="utf-8"?>
-<p:sld xmlns:a="http://schemas.openxmlformats.org/drawingml/2006/main" xmlns:r="http://schemas.openxmlformats.org/officeDocument/2006/relationships" xmlns:p="http://schemas.openxmlformats.org/presentationml/2006/main">
-  <p:cSld>
-    <p:spTree>
-      <p:nvGrpSpPr>
-        <p:cNvPr id="1" name="">
-          <a:extLst>
-            <a:ext uri="{FF2B5EF4-FFF2-40B4-BE49-F238E27FC236}">
-              <a16:creationId xmlns:a16="http://schemas.microsoft.com/office/drawing/2014/main" id="{1B2CB311-DC1A-76F9-2E13-2C8F5671ECAC}"/>
-            </a:ext>
-          </a:extLst>
-        </p:cNvPr>
-        <p:cNvGrpSpPr/>
-        <p:nvPr/>
-      </p:nvGrpSpPr>
-      <p:grpSpPr>
-        <a:xfrm>
-          <a:off x="0" y="0"/>
-          <a:ext cx="0" cy="0"/>
-          <a:chOff x="0" y="0"/>
-          <a:chExt cx="0" cy="0"/>
-        </a:xfrm>
-      </p:grpSpPr>
-      <p:sp>
-        <p:nvSpPr>
-          <p:cNvPr id="2" name="슬라이드 번호 개체 틀 1">
-            <a:extLst>
-              <a:ext uri="{FF2B5EF4-FFF2-40B4-BE49-F238E27FC236}">
-                <a16:creationId xmlns:a16="http://schemas.microsoft.com/office/drawing/2014/main" id="{A2893DB1-A2C7-DE9A-5ACD-7C8DC81AC1EE}"/>
-              </a:ext>
-            </a:extLst>
-          </p:cNvPr>
-          <p:cNvSpPr>
-            <a:spLocks noGrp="1"/>
-          </p:cNvSpPr>
-          <p:nvPr>
-            <p:ph type="sldNum" sz="quarter" idx="12"/>
-          </p:nvPr>
-        </p:nvSpPr>
-        <p:spPr/>
-        <p:txBody>
-          <a:bodyPr/>
-          <a:lstStyle/>
-          <a:p>
-            <a:r>
-              <a:rPr lang="en-US" altLang="ko-KR" dirty="0"/>
-              <a:t>-</a:t>
-            </a:r>
-            <a:fld id="{3D16D23B-24D6-455E-BBD7-6975BEA16FD4}" type="slidenum">
-              <a:rPr lang="ko-KR" altLang="en-US" smtClean="0"/>
-              <a:pPr/>
-              <a:t>9</a:t>
-            </a:fld>
-            <a:r>
-              <a:rPr lang="en-US" altLang="ko-KR" dirty="0"/>
-              <a:t>-</a:t>
-            </a:r>
-            <a:endParaRPr lang="ko-KR" altLang="en-US" dirty="0"/>
-          </a:p>
-        </p:txBody>
-      </p:sp>
-      <p:sp>
-        <p:nvSpPr>
-          <p:cNvPr id="3" name="제목 2">
-            <a:extLst>
-              <a:ext uri="{FF2B5EF4-FFF2-40B4-BE49-F238E27FC236}">
-                <a16:creationId xmlns:a16="http://schemas.microsoft.com/office/drawing/2014/main" id="{7AE11317-F4E2-3DF5-690D-CECB7AA1E5CD}"/>
-              </a:ext>
-            </a:extLst>
-          </p:cNvPr>
-          <p:cNvSpPr>
-            <a:spLocks noGrp="1"/>
-          </p:cNvSpPr>
-          <p:nvPr>
-            <p:ph type="title"/>
-          </p:nvPr>
-        </p:nvSpPr>
-        <p:spPr>
-          <a:xfrm>
-            <a:off x="391886" y="173474"/>
-            <a:ext cx="11800114" cy="573577"/>
-          </a:xfrm>
-        </p:spPr>
-        <p:txBody>
-          <a:bodyPr/>
-          <a:lstStyle/>
-          <a:p>
-            <a:r>
-              <a:rPr lang="en-US" altLang="ko-KR" dirty="0">
-                <a:latin typeface="+mj-ea"/>
-              </a:rPr>
-              <a:t>Requirements – Handle Unterminated Str and Char Const (6/8)</a:t>
-            </a:r>
-            <a:endParaRPr lang="ko-KR" altLang="en-US" dirty="0">
-              <a:latin typeface="+mj-ea"/>
-            </a:endParaRPr>
-          </a:p>
-        </p:txBody>
-      </p:sp>
-      <p:sp>
-        <p:nvSpPr>
-          <p:cNvPr id="4" name="텍스트 개체 틀 3">
-            <a:extLst>
-              <a:ext uri="{FF2B5EF4-FFF2-40B4-BE49-F238E27FC236}">
-                <a16:creationId xmlns:a16="http://schemas.microsoft.com/office/drawing/2014/main" id="{A78D9850-5D63-BAD4-9A94-F3B2580CCCAF}"/>
-              </a:ext>
-            </a:extLst>
-          </p:cNvPr>
-          <p:cNvSpPr>
-            <a:spLocks noGrp="1"/>
-          </p:cNvSpPr>
-          <p:nvPr>
-            <p:ph type="body" sz="quarter" idx="13"/>
-          </p:nvPr>
-        </p:nvSpPr>
-        <p:spPr>
-          <a:xfrm>
-            <a:off x="581808" y="4340180"/>
-            <a:ext cx="10987340" cy="1700696"/>
-          </a:xfrm>
-        </p:spPr>
-        <p:txBody>
-          <a:bodyPr/>
-          <a:lstStyle/>
-          <a:p>
-            <a:r>
-              <a:rPr lang="en-US" altLang="ko-KR" dirty="0">
-                <a:latin typeface="+mn-ea"/>
-              </a:rPr>
-              <a:t>Handle unterminated str and char const w/o generating errors or warnings</a:t>
-            </a:r>
-          </a:p>
-          <a:p>
-            <a:r>
-              <a:rPr lang="en-US" altLang="ko-KR" dirty="0">
-                <a:latin typeface="+mn-ea"/>
-              </a:rPr>
-              <a:t>A C compiler would incur an error (newline character in a string constant)</a:t>
-            </a:r>
-            <a:endParaRPr lang="en-US" altLang="ko-KR" dirty="0">
-              <a:solidFill>
-                <a:schemeClr val="tx1"/>
-              </a:solidFill>
-              <a:latin typeface="+mn-ea"/>
-            </a:endParaRPr>
-          </a:p>
-          <a:p>
-            <a:pPr lvl="1"/>
-            <a:r>
-              <a:rPr lang="en-US" altLang="ko-KR" dirty="0">
-                <a:solidFill>
-                  <a:schemeClr val="tx1"/>
-                </a:solidFill>
-                <a:latin typeface="+mn-ea"/>
-              </a:rPr>
-              <a:t>But many C preprocessors would not</a:t>
-            </a:r>
-          </a:p>
-          <a:p>
-            <a:pPr lvl="1"/>
-            <a:r>
-              <a:rPr lang="en-US" altLang="ko-KR" dirty="0">
-                <a:latin typeface="+mn-ea"/>
-              </a:rPr>
-              <a:t>And your program should not either</a:t>
-            </a:r>
-            <a:endParaRPr lang="en-US" altLang="ko-KR" dirty="0">
-              <a:solidFill>
-                <a:schemeClr val="tx1"/>
-              </a:solidFill>
-              <a:latin typeface="+mn-ea"/>
-            </a:endParaRPr>
-          </a:p>
-        </p:txBody>
-      </p:sp>
-      <p:graphicFrame>
-        <p:nvGraphicFramePr>
-          <p:cNvPr id="22" name="표 21">
-            <a:extLst>
-              <a:ext uri="{FF2B5EF4-FFF2-40B4-BE49-F238E27FC236}">
-                <a16:creationId xmlns:a16="http://schemas.microsoft.com/office/drawing/2014/main" id="{105F894E-E23B-7E1D-A47D-1AC282F25A32}"/>
-              </a:ext>
-            </a:extLst>
-          </p:cNvPr>
-          <p:cNvGraphicFramePr>
-            <a:graphicFrameLocks noGrp="1"/>
-          </p:cNvGraphicFramePr>
-          <p:nvPr>
-            <p:extLst>
-              <p:ext uri="{D42A27DB-BD31-4B8C-83A1-F6EECF244321}">
-                <p14:modId xmlns:p14="http://schemas.microsoft.com/office/powerpoint/2010/main" val="1507073560"/>
-              </p:ext>
-            </p:extLst>
-          </p:nvPr>
-        </p:nvGraphicFramePr>
-        <p:xfrm>
-          <a:off x="567087" y="1048463"/>
-          <a:ext cx="11057825" cy="2990305"/>
-        </p:xfrm>
-        <a:graphic>
-          <a:graphicData uri="http://schemas.openxmlformats.org/drawingml/2006/table">
-            <a:tbl>
-              <a:tblPr firstRow="1" bandRow="1">
-                <a:tableStyleId>{5C22544A-7EE6-4342-B048-85BDC9FD1C3A}</a:tableStyleId>
-              </a:tblPr>
-              <a:tblGrid>
-                <a:gridCol w="1366253">
-                  <a:extLst>
-                    <a:ext uri="{9D8B030D-6E8A-4147-A177-3AD203B41FA5}">
-                      <a16:colId xmlns:a16="http://schemas.microsoft.com/office/drawing/2014/main" val="2682864544"/>
-                    </a:ext>
-                  </a:extLst>
-                </a:gridCol>
-                <a:gridCol w="4055752">
-                  <a:extLst>
-                    <a:ext uri="{9D8B030D-6E8A-4147-A177-3AD203B41FA5}">
-                      <a16:colId xmlns:a16="http://schemas.microsoft.com/office/drawing/2014/main" val="2891475324"/>
-                    </a:ext>
-                  </a:extLst>
-                </a:gridCol>
-                <a:gridCol w="4018209">
-                  <a:extLst>
-                    <a:ext uri="{9D8B030D-6E8A-4147-A177-3AD203B41FA5}">
-                      <a16:colId xmlns:a16="http://schemas.microsoft.com/office/drawing/2014/main" val="163360775"/>
-                    </a:ext>
-                  </a:extLst>
-                </a:gridCol>
-                <a:gridCol w="1617611">
-                  <a:extLst>
-                    <a:ext uri="{9D8B030D-6E8A-4147-A177-3AD203B41FA5}">
-                      <a16:colId xmlns:a16="http://schemas.microsoft.com/office/drawing/2014/main" val="3459507647"/>
-                    </a:ext>
-                  </a:extLst>
-                </a:gridCol>
-              </a:tblGrid>
-              <a:tr h="671669">
-                <a:tc>
-                  <a:txBody>
-                    <a:bodyPr/>
-                    <a:lstStyle/>
-                    <a:p>
-                      <a:pPr marL="0" marR="0" lvl="0" indent="0" algn="ctr" defTabSz="914377" rtl="0" eaLnBrk="1" fontAlgn="auto" latinLnBrk="1" hangingPunct="1">
-                        <a:lnSpc>
-                          <a:spcPct val="100000"/>
-                        </a:lnSpc>
-                        <a:spcBef>
-                          <a:spcPts val="0"/>
-                        </a:spcBef>
-                        <a:spcAft>
-                          <a:spcPts val="0"/>
-                        </a:spcAft>
-                        <a:buClrTx/>
-                        <a:buSzTx/>
-                        <a:buFontTx/>
-                        <a:buNone/>
-                        <a:tabLst/>
-                        <a:defRPr/>
-                      </a:pPr>
-                      <a:r>
-                        <a:rPr lang="en-US" altLang="ko-KR" b="0" dirty="0">
-                          <a:latin typeface="+mn-ea"/>
-                          <a:ea typeface="+mn-ea"/>
-                        </a:rPr>
-                        <a:t>Case</a:t>
-                      </a:r>
-                      <a:endParaRPr lang="ko-KR" altLang="en-US" b="0" dirty="0">
-                        <a:latin typeface="+mn-ea"/>
-                        <a:ea typeface="+mn-ea"/>
-                      </a:endParaRPr>
-                    </a:p>
-                  </a:txBody>
-                  <a:tcPr anchor="ctr"/>
-                </a:tc>
-                <a:tc>
-                  <a:txBody>
-                    <a:bodyPr/>
-                    <a:lstStyle/>
-                    <a:p>
-                      <a:pPr marL="0" marR="0" lvl="0" indent="0" algn="ctr" defTabSz="914377" rtl="0" eaLnBrk="1" fontAlgn="auto" latinLnBrk="1" hangingPunct="1">
-                        <a:lnSpc>
-                          <a:spcPct val="100000"/>
-                        </a:lnSpc>
-                        <a:spcBef>
-                          <a:spcPts val="0"/>
-                        </a:spcBef>
-                        <a:spcAft>
-                          <a:spcPts val="0"/>
-                        </a:spcAft>
-                        <a:buClrTx/>
-                        <a:buSzTx/>
-                        <a:buFontTx/>
-                        <a:buNone/>
-                        <a:tabLst/>
-                        <a:defRPr/>
-                      </a:pPr>
-                      <a:r>
-                        <a:rPr lang="en-US" altLang="ko-KR" b="0">
-                          <a:latin typeface="+mn-ea"/>
-                          <a:ea typeface="+mn-ea"/>
-                        </a:rPr>
-                        <a:t>Standard Input Stream</a:t>
-                      </a:r>
-                      <a:endParaRPr lang="ko-KR" altLang="en-US" b="0" dirty="0">
-                        <a:latin typeface="+mn-ea"/>
-                        <a:ea typeface="+mn-ea"/>
-                      </a:endParaRPr>
-                    </a:p>
-                  </a:txBody>
-                  <a:tcPr anchor="ctr"/>
-                </a:tc>
-                <a:tc>
-                  <a:txBody>
-                    <a:bodyPr/>
-                    <a:lstStyle/>
-                    <a:p>
-                      <a:pPr marL="0" marR="0" lvl="0" indent="0" algn="ctr" defTabSz="914377" rtl="0" eaLnBrk="1" fontAlgn="auto" latinLnBrk="1" hangingPunct="1">
-                        <a:lnSpc>
-                          <a:spcPct val="100000"/>
-                        </a:lnSpc>
-                        <a:spcBef>
-                          <a:spcPts val="0"/>
-                        </a:spcBef>
-                        <a:spcAft>
-                          <a:spcPts val="0"/>
-                        </a:spcAft>
-                        <a:buClrTx/>
-                        <a:buSzTx/>
-                        <a:buFontTx/>
-                        <a:buNone/>
-                        <a:tabLst/>
-                        <a:defRPr/>
-                      </a:pPr>
-                      <a:r>
-                        <a:rPr lang="en-US" altLang="ko-KR" b="0">
-                          <a:latin typeface="+mn-ea"/>
-                          <a:ea typeface="+mn-ea"/>
-                        </a:rPr>
-                        <a:t>Standard Output Stream</a:t>
-                      </a:r>
-                      <a:endParaRPr lang="ko-KR" altLang="en-US" b="0" dirty="0">
-                        <a:latin typeface="+mn-ea"/>
-                        <a:ea typeface="+mn-ea"/>
-                      </a:endParaRPr>
-                    </a:p>
-                  </a:txBody>
-                  <a:tcPr anchor="ctr"/>
-                </a:tc>
-                <a:tc>
-                  <a:txBody>
-                    <a:bodyPr/>
-                    <a:lstStyle/>
-                    <a:p>
-                      <a:pPr marL="0" marR="0" lvl="0" indent="0" algn="ctr" defTabSz="914377" rtl="0" eaLnBrk="1" fontAlgn="auto" latinLnBrk="1" hangingPunct="1">
-                        <a:lnSpc>
-                          <a:spcPct val="100000"/>
-                        </a:lnSpc>
-                        <a:spcBef>
-                          <a:spcPts val="0"/>
-                        </a:spcBef>
-                        <a:spcAft>
-                          <a:spcPts val="0"/>
-                        </a:spcAft>
-                        <a:buClrTx/>
-                        <a:buSzTx/>
-                        <a:buFontTx/>
-                        <a:buNone/>
-                        <a:tabLst/>
-                        <a:defRPr/>
-                      </a:pPr>
-                      <a:r>
-                        <a:rPr lang="en-US" altLang="ko-KR" b="0">
-                          <a:latin typeface="+mn-ea"/>
-                          <a:ea typeface="+mn-ea"/>
-                        </a:rPr>
-                        <a:t>Standard Error Stream</a:t>
-                      </a:r>
-                      <a:endParaRPr lang="ko-KR" altLang="en-US" b="0" dirty="0">
-                        <a:latin typeface="+mn-ea"/>
-                        <a:ea typeface="+mn-ea"/>
-                      </a:endParaRPr>
-                    </a:p>
-                  </a:txBody>
-                  <a:tcPr anchor="ctr"/>
-                </a:tc>
-                <a:extLst>
-                  <a:ext uri="{0D108BD9-81ED-4DB2-BD59-A6C34878D82A}">
-                    <a16:rowId xmlns:a16="http://schemas.microsoft.com/office/drawing/2014/main" val="1272094073"/>
-                  </a:ext>
-                </a:extLst>
-              </a:tr>
-              <a:tr h="1159318">
-                <a:tc>
-                  <a:txBody>
-                    <a:bodyPr/>
-                    <a:lstStyle/>
-                    <a:p>
-                      <a:pPr marL="0" marR="0" lvl="0" indent="0" algn="ctr" defTabSz="914377" rtl="0" eaLnBrk="1" fontAlgn="auto" latinLnBrk="1" hangingPunct="1">
-                        <a:lnSpc>
-                          <a:spcPct val="100000"/>
-                        </a:lnSpc>
-                        <a:spcBef>
-                          <a:spcPts val="0"/>
-                        </a:spcBef>
-                        <a:spcAft>
-                          <a:spcPts val="0"/>
-                        </a:spcAft>
-                        <a:buClrTx/>
-                        <a:buSzTx/>
-                        <a:buFontTx/>
-                        <a:buNone/>
-                        <a:tabLst/>
-                        <a:defRPr/>
-                      </a:pPr>
-                      <a:r>
-                        <a:rPr lang="en-US" altLang="ko-KR" sz="1800">
-                          <a:latin typeface="+mn-ea"/>
-                          <a:ea typeface="+mn-ea"/>
-                        </a:rPr>
-                        <a:t>Part of the string</a:t>
-                      </a:r>
-                      <a:endParaRPr lang="ko-KR" altLang="en-US" sz="1800" dirty="0">
-                        <a:latin typeface="+mn-ea"/>
-                        <a:ea typeface="+mn-ea"/>
-                      </a:endParaRPr>
-                    </a:p>
-                  </a:txBody>
-                  <a:tcPr anchor="ctr"/>
-                </a:tc>
-                <a:tc>
-                  <a:txBody>
-                    <a:bodyPr/>
-                    <a:lstStyle/>
-                    <a:p>
-                      <a:pPr algn="ctr"/>
-                      <a:r>
-                        <a:rPr lang="en-US" altLang="ko-KR" sz="2800" dirty="0" err="1">
-                          <a:latin typeface="+mn-ea"/>
-                          <a:ea typeface="+mn-ea"/>
-                        </a:rPr>
-                        <a:t>abc"def</a:t>
-                      </a:r>
-                      <a:r>
-                        <a:rPr lang="en-US" altLang="ko-KR" sz="2800" dirty="0">
-                          <a:latin typeface="+mn-ea"/>
-                          <a:ea typeface="+mn-ea"/>
-                        </a:rPr>
-                        <a:t>/*</a:t>
-                      </a:r>
-                      <a:r>
-                        <a:rPr lang="en-US" altLang="ko-KR" sz="2800" dirty="0" err="1">
-                          <a:latin typeface="+mn-ea"/>
-                          <a:ea typeface="+mn-ea"/>
-                        </a:rPr>
-                        <a:t>ghi</a:t>
-                      </a:r>
-                      <a:r>
-                        <a:rPr lang="en-US" altLang="ko-KR" sz="2800" dirty="0">
-                          <a:latin typeface="+mn-ea"/>
-                          <a:ea typeface="+mn-ea"/>
-                        </a:rPr>
-                        <a:t>*/</a:t>
-                      </a:r>
-                      <a:r>
-                        <a:rPr lang="en-US" altLang="ko-KR" sz="2800" dirty="0" err="1">
-                          <a:latin typeface="+mn-ea"/>
-                          <a:ea typeface="+mn-ea"/>
-                        </a:rPr>
-                        <a:t>jkl</a:t>
-                      </a:r>
-                      <a:r>
-                        <a:rPr lang="en-US" altLang="ko-KR" sz="2800" baseline="-25000" dirty="0" err="1">
-                          <a:latin typeface="+mn-ea"/>
-                          <a:ea typeface="+mn-ea"/>
-                        </a:rPr>
-                        <a:t>n</a:t>
-                      </a:r>
-                      <a:endParaRPr lang="ko-KR" altLang="en-US" sz="2800" dirty="0">
-                        <a:latin typeface="+mn-ea"/>
-                        <a:ea typeface="+mn-ea"/>
-                      </a:endParaRPr>
-                    </a:p>
-                  </a:txBody>
-                  <a:tcPr anchor="ctr"/>
-                </a:tc>
-                <a:tc>
-                  <a:txBody>
-                    <a:bodyPr/>
-                    <a:lstStyle/>
-                    <a:p>
-                      <a:pPr algn="ctr"/>
-                      <a:r>
-                        <a:rPr lang="en-US" altLang="ko-KR" sz="2800" dirty="0" err="1">
-                          <a:latin typeface="+mn-ea"/>
-                          <a:ea typeface="+mn-ea"/>
-                        </a:rPr>
-                        <a:t>abc"def</a:t>
-                      </a:r>
-                      <a:r>
-                        <a:rPr lang="en-US" altLang="ko-KR" sz="2800" dirty="0">
-                          <a:latin typeface="+mn-ea"/>
-                          <a:ea typeface="+mn-ea"/>
-                        </a:rPr>
-                        <a:t>/*</a:t>
-                      </a:r>
-                      <a:r>
-                        <a:rPr lang="en-US" altLang="ko-KR" sz="2800" dirty="0" err="1">
-                          <a:latin typeface="+mn-ea"/>
-                          <a:ea typeface="+mn-ea"/>
-                        </a:rPr>
-                        <a:t>ghi</a:t>
-                      </a:r>
-                      <a:r>
-                        <a:rPr lang="en-US" altLang="ko-KR" sz="2800" dirty="0">
-                          <a:latin typeface="+mn-ea"/>
-                          <a:ea typeface="+mn-ea"/>
-                        </a:rPr>
-                        <a:t>*/</a:t>
-                      </a:r>
-                      <a:r>
-                        <a:rPr lang="en-US" altLang="ko-KR" sz="2800" dirty="0" err="1">
-                          <a:latin typeface="+mn-ea"/>
-                          <a:ea typeface="+mn-ea"/>
-                        </a:rPr>
-                        <a:t>jkl</a:t>
-                      </a:r>
-                      <a:r>
-                        <a:rPr lang="en-US" altLang="ko-KR" sz="2800" baseline="-25000" dirty="0" err="1">
-                          <a:latin typeface="+mn-ea"/>
-                          <a:ea typeface="+mn-ea"/>
-                        </a:rPr>
-                        <a:t>n</a:t>
-                      </a:r>
-                      <a:endParaRPr lang="ko-KR" altLang="en-US" sz="2800" dirty="0">
-                        <a:latin typeface="+mn-ea"/>
-                        <a:ea typeface="+mn-ea"/>
-                      </a:endParaRPr>
-                    </a:p>
-                  </a:txBody>
-                  <a:tcPr anchor="ctr"/>
-                </a:tc>
-                <a:tc>
-                  <a:txBody>
-                    <a:bodyPr/>
-                    <a:lstStyle/>
-                    <a:p>
-                      <a:pPr algn="ctr" latinLnBrk="1"/>
-                      <a:endParaRPr lang="ko-KR" altLang="en-US" sz="3600" dirty="0">
-                        <a:latin typeface="+mn-ea"/>
-                        <a:ea typeface="+mn-ea"/>
-                      </a:endParaRPr>
-                    </a:p>
-                  </a:txBody>
-                  <a:tcPr anchor="ctr"/>
-                </a:tc>
-                <a:extLst>
-                  <a:ext uri="{0D108BD9-81ED-4DB2-BD59-A6C34878D82A}">
-                    <a16:rowId xmlns:a16="http://schemas.microsoft.com/office/drawing/2014/main" val="966249997"/>
-                  </a:ext>
-                </a:extLst>
-              </a:tr>
-              <a:tr h="1159318">
-                <a:tc>
-                  <a:txBody>
-                    <a:bodyPr/>
-                    <a:lstStyle/>
-                    <a:p>
-                      <a:pPr marL="0" marR="0" lvl="0" indent="0" algn="ctr" defTabSz="914377" rtl="0" eaLnBrk="1" fontAlgn="auto" latinLnBrk="1" hangingPunct="1">
-                        <a:lnSpc>
-                          <a:spcPct val="100000"/>
-                        </a:lnSpc>
-                        <a:spcBef>
-                          <a:spcPts val="0"/>
-                        </a:spcBef>
-                        <a:spcAft>
-                          <a:spcPts val="0"/>
-                        </a:spcAft>
-                        <a:buClrTx/>
-                        <a:buSzTx/>
-                        <a:buFontTx/>
-                        <a:buNone/>
-                        <a:tabLst/>
-                        <a:defRPr/>
-                      </a:pPr>
-                      <a:r>
-                        <a:rPr lang="en-US" altLang="ko-KR" sz="1800">
-                          <a:latin typeface="+mn-ea"/>
-                          <a:ea typeface="+mn-ea"/>
-                        </a:rPr>
-                        <a:t>Part of the character constant</a:t>
-                      </a:r>
-                      <a:endParaRPr lang="ko-KR" altLang="en-US" sz="1800" dirty="0">
-                        <a:latin typeface="+mn-ea"/>
-                        <a:ea typeface="+mn-ea"/>
-                      </a:endParaRPr>
-                    </a:p>
-                  </a:txBody>
-                  <a:tcPr anchor="ctr"/>
-                </a:tc>
-                <a:tc>
-                  <a:txBody>
-                    <a:bodyPr/>
-                    <a:lstStyle/>
-                    <a:p>
-                      <a:pPr algn="ctr"/>
-                      <a:r>
-                        <a:rPr lang="en-US" altLang="ko-KR" sz="2800" dirty="0" err="1">
-                          <a:latin typeface="+mn-ea"/>
-                          <a:ea typeface="+mn-ea"/>
-                        </a:rPr>
-                        <a:t>abc'def</a:t>
-                      </a:r>
-                      <a:r>
-                        <a:rPr lang="en-US" altLang="ko-KR" sz="2800" dirty="0">
-                          <a:latin typeface="+mn-ea"/>
-                          <a:ea typeface="+mn-ea"/>
-                        </a:rPr>
-                        <a:t>/*</a:t>
-                      </a:r>
-                      <a:r>
-                        <a:rPr lang="en-US" altLang="ko-KR" sz="2800" dirty="0" err="1">
-                          <a:latin typeface="+mn-ea"/>
-                          <a:ea typeface="+mn-ea"/>
-                        </a:rPr>
-                        <a:t>ghi</a:t>
-                      </a:r>
-                      <a:r>
-                        <a:rPr lang="en-US" altLang="ko-KR" sz="2800" dirty="0">
-                          <a:latin typeface="+mn-ea"/>
-                          <a:ea typeface="+mn-ea"/>
-                        </a:rPr>
-                        <a:t>*/</a:t>
-                      </a:r>
-                      <a:r>
-                        <a:rPr lang="en-US" altLang="ko-KR" sz="2800" dirty="0" err="1">
-                          <a:latin typeface="+mn-ea"/>
-                          <a:ea typeface="+mn-ea"/>
-                        </a:rPr>
-                        <a:t>jkl</a:t>
-                      </a:r>
-                      <a:r>
-                        <a:rPr lang="en-US" altLang="ko-KR" sz="2800" baseline="-25000" dirty="0" err="1">
-                          <a:latin typeface="+mn-ea"/>
-                          <a:ea typeface="+mn-ea"/>
-                        </a:rPr>
-                        <a:t>n</a:t>
-                      </a:r>
-                      <a:endParaRPr lang="ko-KR" altLang="en-US" sz="2800" dirty="0">
-                        <a:latin typeface="+mn-ea"/>
-                        <a:ea typeface="+mn-ea"/>
-                      </a:endParaRPr>
-                    </a:p>
-                  </a:txBody>
-                  <a:tcPr anchor="ctr"/>
-                </a:tc>
-                <a:tc>
-                  <a:txBody>
-                    <a:bodyPr/>
-                    <a:lstStyle/>
-                    <a:p>
-                      <a:pPr algn="ctr"/>
-                      <a:r>
-                        <a:rPr lang="en-US" altLang="ko-KR" sz="2800" dirty="0" err="1">
-                          <a:latin typeface="+mn-ea"/>
-                          <a:ea typeface="+mn-ea"/>
-                        </a:rPr>
-                        <a:t>abc'def</a:t>
-                      </a:r>
-                      <a:r>
-                        <a:rPr lang="en-US" altLang="ko-KR" sz="2800" dirty="0">
-                          <a:latin typeface="+mn-ea"/>
-                          <a:ea typeface="+mn-ea"/>
-                        </a:rPr>
-                        <a:t>/*</a:t>
-                      </a:r>
-                      <a:r>
-                        <a:rPr lang="en-US" altLang="ko-KR" sz="2800" dirty="0" err="1">
-                          <a:latin typeface="+mn-ea"/>
-                          <a:ea typeface="+mn-ea"/>
-                        </a:rPr>
-                        <a:t>ghi</a:t>
-                      </a:r>
-                      <a:r>
-                        <a:rPr lang="en-US" altLang="ko-KR" sz="2800" dirty="0">
-                          <a:latin typeface="+mn-ea"/>
-                          <a:ea typeface="+mn-ea"/>
-                        </a:rPr>
-                        <a:t>*/</a:t>
-                      </a:r>
-                      <a:r>
-                        <a:rPr lang="en-US" altLang="ko-KR" sz="2800" dirty="0" err="1">
-                          <a:latin typeface="+mn-ea"/>
-                          <a:ea typeface="+mn-ea"/>
-                        </a:rPr>
-                        <a:t>jkl</a:t>
-                      </a:r>
-                      <a:r>
-                        <a:rPr lang="en-US" altLang="ko-KR" sz="2800" baseline="-25000" dirty="0" err="1">
-                          <a:latin typeface="+mn-ea"/>
-                          <a:ea typeface="+mn-ea"/>
-                        </a:rPr>
-                        <a:t>n</a:t>
-                      </a:r>
-                      <a:endParaRPr lang="ko-KR" altLang="en-US" sz="2800" dirty="0">
-                        <a:latin typeface="+mn-ea"/>
-                        <a:ea typeface="+mn-ea"/>
-                      </a:endParaRPr>
-                    </a:p>
-                  </a:txBody>
-                  <a:tcPr anchor="ctr"/>
-                </a:tc>
-                <a:tc>
-                  <a:txBody>
-                    <a:bodyPr/>
-                    <a:lstStyle/>
-                    <a:p>
-                      <a:pPr algn="ctr" latinLnBrk="1"/>
-                      <a:endParaRPr lang="ko-KR" altLang="en-US" sz="3600" dirty="0">
-                        <a:latin typeface="+mn-ea"/>
-                        <a:ea typeface="+mn-ea"/>
-                      </a:endParaRPr>
-                    </a:p>
-                  </a:txBody>
-                  <a:tcPr anchor="ctr"/>
-                </a:tc>
-                <a:extLst>
-                  <a:ext uri="{0D108BD9-81ED-4DB2-BD59-A6C34878D82A}">
-                    <a16:rowId xmlns:a16="http://schemas.microsoft.com/office/drawing/2014/main" val="3420706579"/>
-                  </a:ext>
-                </a:extLst>
-              </a:tr>
-            </a:tbl>
-          </a:graphicData>
-        </a:graphic>
-      </p:graphicFrame>
-    </p:spTree>
-    <p:extLst>
-      <p:ext uri="{BB962C8B-B14F-4D97-AF65-F5344CB8AC3E}">
-        <p14:creationId xmlns:p14="http://schemas.microsoft.com/office/powerpoint/2010/main" val="1587695275"/>
       </p:ext>
     </p:extLst>
   </p:cSld>
@@ -12433,15 +13228,6 @@
 </file>
 
 <file path=customXml/item1.xml><?xml version="1.0" encoding="utf-8"?>
-<?mso-contentType ?>
-<FormTemplates xmlns="http://schemas.microsoft.com/sharepoint/v3/contenttype/forms">
-  <Display>DocumentLibraryForm</Display>
-  <Edit>DocumentLibraryForm</Edit>
-  <New>DocumentLibraryForm</New>
-</FormTemplates>
-</file>
-
-<file path=customXml/item2.xml><?xml version="1.0" encoding="utf-8"?>
 <ct:contentTypeSchema xmlns:ct="http://schemas.microsoft.com/office/2006/metadata/contentType" xmlns:ma="http://schemas.microsoft.com/office/2006/metadata/properties/metaAttributes" ct:_="" ma:_="" ma:contentTypeName="문서" ma:contentTypeID="0x010100B13A780F21B7B348A6680E3144BFCE9C" ma:contentTypeVersion="15" ma:contentTypeDescription="새 문서를 만듭니다." ma:contentTypeScope="" ma:versionID="315e2f9321505756d7459e9716ab0625">
   <xsd:schema xmlns:xsd="http://www.w3.org/2001/XMLSchema" xmlns:xs="http://www.w3.org/2001/XMLSchema" xmlns:p="http://schemas.microsoft.com/office/2006/metadata/properties" xmlns:ns3="98ea1fc7-f953-4aaa-91ec-cf6845fb1fba" xmlns:ns4="8f55a661-4739-4359-9e39-c48271756d25" targetNamespace="http://schemas.microsoft.com/office/2006/metadata/properties" ma:root="true" ma:fieldsID="63fa1282b343a602878bac01e3784c2e" ns3:_="" ns4:_="">
     <xsd:import namespace="98ea1fc7-f953-4aaa-91ec-cf6845fb1fba"/>
@@ -12676,6 +13462,15 @@
 </ct:contentTypeSchema>
 </file>
 
+<file path=customXml/item2.xml><?xml version="1.0" encoding="utf-8"?>
+<?mso-contentType ?>
+<FormTemplates xmlns="http://schemas.microsoft.com/sharepoint/v3/contenttype/forms">
+  <Display>DocumentLibraryForm</Display>
+  <Edit>DocumentLibraryForm</Edit>
+  <New>DocumentLibraryForm</New>
+</FormTemplates>
+</file>
+
 <file path=customXml/item3.xml><?xml version="1.0" encoding="utf-8"?>
 <p:properties xmlns:p="http://schemas.microsoft.com/office/2006/metadata/properties" xmlns:xsi="http://www.w3.org/2001/XMLSchema-instance" xmlns:pc="http://schemas.microsoft.com/office/infopath/2007/PartnerControls">
   <documentManagement>
@@ -12685,14 +13480,6 @@
 </file>
 
 <file path=customXml/itemProps1.xml><?xml version="1.0" encoding="utf-8"?>
-<ds:datastoreItem xmlns:ds="http://schemas.openxmlformats.org/officeDocument/2006/customXml" ds:itemID="{FA69A468-826F-49B5-9C90-6FF5D0BE2C54}">
-  <ds:schemaRefs>
-    <ds:schemaRef ds:uri="http://schemas.microsoft.com/sharepoint/v3/contenttype/forms"/>
-  </ds:schemaRefs>
-</ds:datastoreItem>
-</file>
-
-<file path=customXml/itemProps2.xml><?xml version="1.0" encoding="utf-8"?>
 <ds:datastoreItem xmlns:ds="http://schemas.openxmlformats.org/officeDocument/2006/customXml" ds:itemID="{CFB9C563-80BA-4656-AA06-19BE6CDBBCDD}">
   <ds:schemaRefs>
     <ds:schemaRef ds:uri="http://schemas.microsoft.com/office/2006/metadata/contentType"/>
@@ -12707,6 +13494,14 @@
     <ds:schemaRef ds:uri="http://purl.org/dc/elements/1.1/"/>
     <ds:schemaRef ds:uri="http://purl.org/dc/terms/"/>
     <ds:schemaRef ds:uri="http://schemas.microsoft.com/internal/obd"/>
+  </ds:schemaRefs>
+</ds:datastoreItem>
+</file>
+
+<file path=customXml/itemProps2.xml><?xml version="1.0" encoding="utf-8"?>
+<ds:datastoreItem xmlns:ds="http://schemas.openxmlformats.org/officeDocument/2006/customXml" ds:itemID="{FA69A468-826F-49B5-9C90-6FF5D0BE2C54}">
+  <ds:schemaRefs>
+    <ds:schemaRef ds:uri="http://schemas.microsoft.com/sharepoint/v3/contenttype/forms"/>
   </ds:schemaRefs>
 </ds:datastoreItem>
 </file>

</xml_diff>